<commit_message>
Added slides about Shingles,MinHash, LSH and added slide_ita.pdf
</commit_message>
<xml_diff>
--- a/slides/ita/slides_ita.pptx
+++ b/slides/ita/slides_ita.pptx
@@ -6,7 +6,7 @@
     <p:sldMasterId id="2147483665" r:id="rId2"/>
   </p:sldMasterIdLst>
   <p:notesMasterIdLst>
-    <p:notesMasterId r:id="rId16"/>
+    <p:notesMasterId r:id="rId18"/>
   </p:notesMasterIdLst>
   <p:sldIdLst>
     <p:sldId id="256" r:id="rId3"/>
@@ -17,11 +17,13 @@
     <p:sldId id="262" r:id="rId8"/>
     <p:sldId id="275" r:id="rId9"/>
     <p:sldId id="273" r:id="rId10"/>
-    <p:sldId id="277" r:id="rId11"/>
-    <p:sldId id="278" r:id="rId12"/>
-    <p:sldId id="276" r:id="rId13"/>
-    <p:sldId id="270" r:id="rId14"/>
-    <p:sldId id="271" r:id="rId15"/>
+    <p:sldId id="279" r:id="rId11"/>
+    <p:sldId id="277" r:id="rId12"/>
+    <p:sldId id="280" r:id="rId13"/>
+    <p:sldId id="278" r:id="rId14"/>
+    <p:sldId id="276" r:id="rId15"/>
+    <p:sldId id="270" r:id="rId16"/>
+    <p:sldId id="271" r:id="rId17"/>
   </p:sldIdLst>
   <p:sldSz cx="9144000" cy="6858000" type="screen4x3"/>
   <p:notesSz cx="6858000" cy="9144000"/>
@@ -4008,6 +4010,355 @@
         <p:cNvPr id="1" name="">
           <a:extLst>
             <a:ext uri="{FF2B5EF4-FFF2-40B4-BE49-F238E27FC236}">
+              <a16:creationId xmlns:a16="http://schemas.microsoft.com/office/drawing/2014/main" id="{EE7A1980-D373-28DE-31D8-FC7216D4ECA9}"/>
+            </a:ext>
+          </a:extLst>
+        </p:cNvPr>
+        <p:cNvGrpSpPr/>
+        <p:nvPr/>
+      </p:nvGrpSpPr>
+      <p:grpSpPr>
+        <a:xfrm>
+          <a:off x="0" y="0"/>
+          <a:ext cx="0" cy="0"/>
+          <a:chOff x="0" y="0"/>
+          <a:chExt cx="0" cy="0"/>
+        </a:xfrm>
+      </p:grpSpPr>
+      <p:sp>
+        <p:nvSpPr>
+          <p:cNvPr id="2" name="Title 1">
+            <a:extLst>
+              <a:ext uri="{FF2B5EF4-FFF2-40B4-BE49-F238E27FC236}">
+                <a16:creationId xmlns:a16="http://schemas.microsoft.com/office/drawing/2014/main" id="{A7053784-8BAC-28C2-9CAA-C9963985401E}"/>
+              </a:ext>
+            </a:extLst>
+          </p:cNvPr>
+          <p:cNvSpPr>
+            <a:spLocks noGrp="1"/>
+          </p:cNvSpPr>
+          <p:nvPr>
+            <p:ph type="title"/>
+          </p:nvPr>
+        </p:nvSpPr>
+        <p:spPr/>
+        <p:txBody>
+          <a:bodyPr/>
+          <a:lstStyle/>
+          <a:p>
+            <a:r>
+              <a:rPr lang="it-IT" dirty="0" err="1"/>
+              <a:t>MinHash</a:t>
+            </a:r>
+            <a:r>
+              <a:rPr lang="it-IT" dirty="0"/>
+              <a:t> (1)</a:t>
+            </a:r>
+          </a:p>
+        </p:txBody>
+      </p:sp>
+      <p:sp>
+        <p:nvSpPr>
+          <p:cNvPr id="4" name="Footer Placeholder 3">
+            <a:extLst>
+              <a:ext uri="{FF2B5EF4-FFF2-40B4-BE49-F238E27FC236}">
+                <a16:creationId xmlns:a16="http://schemas.microsoft.com/office/drawing/2014/main" id="{A2F11FE3-1D08-0BA9-5DDD-58A873025931}"/>
+              </a:ext>
+            </a:extLst>
+          </p:cNvPr>
+          <p:cNvSpPr>
+            <a:spLocks noGrp="1"/>
+          </p:cNvSpPr>
+          <p:nvPr>
+            <p:ph type="ftr" sz="quarter" idx="11"/>
+          </p:nvPr>
+        </p:nvSpPr>
+        <p:spPr/>
+        <p:txBody>
+          <a:bodyPr/>
+          <a:lstStyle/>
+          <a:p>
+            <a:r>
+              <a:rPr lang="en-US"/>
+              <a:t>Laurea SS - MIDST– 2023/2024</a:t>
+            </a:r>
+          </a:p>
+        </p:txBody>
+      </p:sp>
+      <p:sp>
+        <p:nvSpPr>
+          <p:cNvPr id="5" name="Slide Number Placeholder 4">
+            <a:extLst>
+              <a:ext uri="{FF2B5EF4-FFF2-40B4-BE49-F238E27FC236}">
+                <a16:creationId xmlns:a16="http://schemas.microsoft.com/office/drawing/2014/main" id="{F5FC3FAC-BB59-5865-A349-D2501A74B54A}"/>
+              </a:ext>
+            </a:extLst>
+          </p:cNvPr>
+          <p:cNvSpPr>
+            <a:spLocks noGrp="1"/>
+          </p:cNvSpPr>
+          <p:nvPr>
+            <p:ph type="sldNum" sz="quarter" idx="12"/>
+          </p:nvPr>
+        </p:nvSpPr>
+        <p:spPr/>
+        <p:txBody>
+          <a:bodyPr/>
+          <a:lstStyle/>
+          <a:p>
+            <a:fld id="{FF73DAB7-F89A-F94F-8C5F-3F656CDF0A97}" type="slidenum">
+              <a:rPr lang="en-US" smtClean="0"/>
+              <a:pPr/>
+              <a:t>10</a:t>
+            </a:fld>
+            <a:endParaRPr lang="en-US"/>
+          </a:p>
+        </p:txBody>
+      </p:sp>
+      <p:sp>
+        <p:nvSpPr>
+          <p:cNvPr id="7" name="Segnaposto contenuto 6">
+            <a:extLst>
+              <a:ext uri="{FF2B5EF4-FFF2-40B4-BE49-F238E27FC236}">
+                <a16:creationId xmlns:a16="http://schemas.microsoft.com/office/drawing/2014/main" id="{17A1019C-96CC-D4E4-8BC7-02DC7FB35CF2}"/>
+              </a:ext>
+            </a:extLst>
+          </p:cNvPr>
+          <p:cNvSpPr>
+            <a:spLocks noGrp="1"/>
+          </p:cNvSpPr>
+          <p:nvPr>
+            <p:ph idx="1"/>
+          </p:nvPr>
+        </p:nvSpPr>
+        <p:spPr/>
+        <p:txBody>
+          <a:bodyPr>
+            <a:normAutofit/>
+          </a:bodyPr>
+          <a:lstStyle/>
+          <a:p>
+            <a:r>
+              <a:rPr lang="it-IT" sz="2400" dirty="0"/>
+              <a:t>Valutare se le signatures di tutti i documenti possono risiedere in memoria centrale, altrimenti</a:t>
+            </a:r>
+          </a:p>
+          <a:p>
+            <a:pPr lvl="1"/>
+            <a:r>
+              <a:rPr lang="it-IT" sz="2400" dirty="0"/>
+              <a:t>Scrittura su disco</a:t>
+            </a:r>
+          </a:p>
+          <a:p>
+            <a:pPr lvl="1"/>
+            <a:r>
+              <a:rPr lang="it-IT" sz="2400" dirty="0"/>
+              <a:t>Modificare parametri delle </a:t>
+            </a:r>
+            <a:r>
+              <a:rPr lang="it-IT" sz="2400" dirty="0" err="1"/>
+              <a:t>shingles</a:t>
+            </a:r>
+            <a:r>
+              <a:rPr lang="it-IT" sz="2400" dirty="0"/>
+              <a:t> e delle permutazioni</a:t>
+            </a:r>
+          </a:p>
+          <a:p>
+            <a:r>
+              <a:rPr lang="it-IT" sz="2400" dirty="0"/>
+              <a:t>Scelta del numero k di permutazioni e relative funzioni hash</a:t>
+            </a:r>
+          </a:p>
+        </p:txBody>
+      </p:sp>
+    </p:spTree>
+    <p:extLst>
+      <p:ext uri="{BB962C8B-B14F-4D97-AF65-F5344CB8AC3E}">
+        <p14:creationId xmlns:p14="http://schemas.microsoft.com/office/powerpoint/2010/main" val="927308424"/>
+      </p:ext>
+    </p:extLst>
+  </p:cSld>
+  <p:clrMapOvr>
+    <a:masterClrMapping/>
+  </p:clrMapOvr>
+</p:sld>
+</file>
+
+<file path=ppt/slides/slide11.xml><?xml version="1.0" encoding="utf-8"?>
+<p:sld xmlns:a="http://schemas.openxmlformats.org/drawingml/2006/main" xmlns:r="http://schemas.openxmlformats.org/officeDocument/2006/relationships" xmlns:p="http://schemas.openxmlformats.org/presentationml/2006/main">
+  <p:cSld>
+    <p:spTree>
+      <p:nvGrpSpPr>
+        <p:cNvPr id="1" name="">
+          <a:extLst>
+            <a:ext uri="{FF2B5EF4-FFF2-40B4-BE49-F238E27FC236}">
+              <a16:creationId xmlns:a16="http://schemas.microsoft.com/office/drawing/2014/main" id="{1F449F64-D916-4347-4511-494A7A44A795}"/>
+            </a:ext>
+          </a:extLst>
+        </p:cNvPr>
+        <p:cNvGrpSpPr/>
+        <p:nvPr/>
+      </p:nvGrpSpPr>
+      <p:grpSpPr>
+        <a:xfrm>
+          <a:off x="0" y="0"/>
+          <a:ext cx="0" cy="0"/>
+          <a:chOff x="0" y="0"/>
+          <a:chExt cx="0" cy="0"/>
+        </a:xfrm>
+      </p:grpSpPr>
+      <p:sp>
+        <p:nvSpPr>
+          <p:cNvPr id="2" name="Title 1">
+            <a:extLst>
+              <a:ext uri="{FF2B5EF4-FFF2-40B4-BE49-F238E27FC236}">
+                <a16:creationId xmlns:a16="http://schemas.microsoft.com/office/drawing/2014/main" id="{B5D843FA-53A7-BEDD-93D9-BA12AD9454B1}"/>
+              </a:ext>
+            </a:extLst>
+          </p:cNvPr>
+          <p:cNvSpPr>
+            <a:spLocks noGrp="1"/>
+          </p:cNvSpPr>
+          <p:nvPr>
+            <p:ph type="title"/>
+          </p:nvPr>
+        </p:nvSpPr>
+        <p:spPr/>
+        <p:txBody>
+          <a:bodyPr/>
+          <a:lstStyle/>
+          <a:p>
+            <a:r>
+              <a:rPr lang="it-IT" dirty="0" err="1"/>
+              <a:t>MinHash</a:t>
+            </a:r>
+            <a:r>
+              <a:rPr lang="it-IT"/>
+              <a:t> (2)</a:t>
+            </a:r>
+            <a:endParaRPr lang="it-IT" dirty="0"/>
+          </a:p>
+        </p:txBody>
+      </p:sp>
+      <p:sp>
+        <p:nvSpPr>
+          <p:cNvPr id="4" name="Footer Placeholder 3">
+            <a:extLst>
+              <a:ext uri="{FF2B5EF4-FFF2-40B4-BE49-F238E27FC236}">
+                <a16:creationId xmlns:a16="http://schemas.microsoft.com/office/drawing/2014/main" id="{B788078A-E3FF-40EF-2682-FB1BF928BC4E}"/>
+              </a:ext>
+            </a:extLst>
+          </p:cNvPr>
+          <p:cNvSpPr>
+            <a:spLocks noGrp="1"/>
+          </p:cNvSpPr>
+          <p:nvPr>
+            <p:ph type="ftr" sz="quarter" idx="11"/>
+          </p:nvPr>
+        </p:nvSpPr>
+        <p:spPr/>
+        <p:txBody>
+          <a:bodyPr/>
+          <a:lstStyle/>
+          <a:p>
+            <a:r>
+              <a:rPr lang="en-US"/>
+              <a:t>Laurea SS - MIDST– 2023/2024</a:t>
+            </a:r>
+          </a:p>
+        </p:txBody>
+      </p:sp>
+      <p:sp>
+        <p:nvSpPr>
+          <p:cNvPr id="5" name="Slide Number Placeholder 4">
+            <a:extLst>
+              <a:ext uri="{FF2B5EF4-FFF2-40B4-BE49-F238E27FC236}">
+                <a16:creationId xmlns:a16="http://schemas.microsoft.com/office/drawing/2014/main" id="{7AC6309D-D02F-9C71-F305-3F393CC0F5C7}"/>
+              </a:ext>
+            </a:extLst>
+          </p:cNvPr>
+          <p:cNvSpPr>
+            <a:spLocks noGrp="1"/>
+          </p:cNvSpPr>
+          <p:nvPr>
+            <p:ph type="sldNum" sz="quarter" idx="12"/>
+          </p:nvPr>
+        </p:nvSpPr>
+        <p:spPr/>
+        <p:txBody>
+          <a:bodyPr/>
+          <a:lstStyle/>
+          <a:p>
+            <a:fld id="{FF73DAB7-F89A-F94F-8C5F-3F656CDF0A97}" type="slidenum">
+              <a:rPr lang="en-US" smtClean="0"/>
+              <a:pPr/>
+              <a:t>11</a:t>
+            </a:fld>
+            <a:endParaRPr lang="en-US"/>
+          </a:p>
+        </p:txBody>
+      </p:sp>
+      <p:sp>
+        <p:nvSpPr>
+          <p:cNvPr id="7" name="Segnaposto contenuto 6">
+            <a:extLst>
+              <a:ext uri="{FF2B5EF4-FFF2-40B4-BE49-F238E27FC236}">
+                <a16:creationId xmlns:a16="http://schemas.microsoft.com/office/drawing/2014/main" id="{326099CF-6C06-A9A9-0262-9FA601913BAB}"/>
+              </a:ext>
+            </a:extLst>
+          </p:cNvPr>
+          <p:cNvSpPr>
+            <a:spLocks noGrp="1"/>
+          </p:cNvSpPr>
+          <p:nvPr>
+            <p:ph idx="1"/>
+          </p:nvPr>
+        </p:nvSpPr>
+        <p:spPr/>
+        <p:txBody>
+          <a:bodyPr>
+            <a:normAutofit/>
+          </a:bodyPr>
+          <a:lstStyle/>
+          <a:p>
+            <a:r>
+              <a:rPr lang="it-IT" sz="2400" dirty="0"/>
+              <a:t>Scelta della struttura dati per le signatures: ciascun documento deve essere identificabile tramite id (per i confronti tra bande di signatures dopo </a:t>
+            </a:r>
+            <a:r>
+              <a:rPr lang="it-IT" sz="2400" dirty="0" err="1"/>
+              <a:t>LSH</a:t>
+            </a:r>
+            <a:r>
+              <a:rPr lang="it-IT" sz="2400" dirty="0"/>
+              <a:t>) e le signatures devono essere delle liste ordinate</a:t>
+            </a:r>
+          </a:p>
+        </p:txBody>
+      </p:sp>
+    </p:spTree>
+    <p:extLst>
+      <p:ext uri="{BB962C8B-B14F-4D97-AF65-F5344CB8AC3E}">
+        <p14:creationId xmlns:p14="http://schemas.microsoft.com/office/powerpoint/2010/main" val="424016511"/>
+      </p:ext>
+    </p:extLst>
+  </p:cSld>
+  <p:clrMapOvr>
+    <a:masterClrMapping/>
+  </p:clrMapOvr>
+</p:sld>
+</file>
+
+<file path=ppt/slides/slide12.xml><?xml version="1.0" encoding="utf-8"?>
+<p:sld xmlns:a="http://schemas.openxmlformats.org/drawingml/2006/main" xmlns:r="http://schemas.openxmlformats.org/officeDocument/2006/relationships" xmlns:p="http://schemas.openxmlformats.org/presentationml/2006/main">
+  <p:cSld>
+    <p:spTree>
+      <p:nvGrpSpPr>
+        <p:cNvPr id="1" name="">
+          <a:extLst>
+            <a:ext uri="{FF2B5EF4-FFF2-40B4-BE49-F238E27FC236}">
               <a16:creationId xmlns:a16="http://schemas.microsoft.com/office/drawing/2014/main" id="{173DA18C-F377-E081-FC42-8702194F57CB}"/>
             </a:ext>
           </a:extLst>
@@ -4104,7 +4455,7 @@
             <a:fld id="{FF73DAB7-F89A-F94F-8C5F-3F656CDF0A97}" type="slidenum">
               <a:rPr lang="en-US" smtClean="0"/>
               <a:pPr/>
-              <a:t>10</a:t>
+              <a:t>12</a:t>
             </a:fld>
             <a:endParaRPr lang="en-US"/>
           </a:p>
@@ -4128,10 +4479,35 @@
         </p:nvSpPr>
         <p:spPr/>
         <p:txBody>
-          <a:bodyPr/>
+          <a:bodyPr>
+            <a:normAutofit/>
+          </a:bodyPr>
           <a:lstStyle/>
           <a:p>
-            <a:endParaRPr lang="it-IT" dirty="0"/>
+            <a:r>
+              <a:rPr lang="it-IT" sz="2400" dirty="0"/>
+              <a:t>Numero di bande</a:t>
+            </a:r>
+          </a:p>
+          <a:p>
+            <a:r>
+              <a:rPr lang="it-IT" sz="2400" dirty="0"/>
+              <a:t>Funzioni hash per la bande</a:t>
+            </a:r>
+          </a:p>
+          <a:p>
+            <a:r>
+              <a:rPr lang="it-IT" sz="2400" dirty="0"/>
+              <a:t>Struttura dati per i bucket: hash-</a:t>
+            </a:r>
+            <a:r>
+              <a:rPr lang="it-IT" sz="2400" dirty="0" err="1"/>
+              <a:t>table</a:t>
+            </a:r>
+            <a:r>
+              <a:rPr lang="it-IT" sz="2400" dirty="0"/>
+              <a:t> dove ad ogni chiave è associata una lista con gli id dei documenti</a:t>
+            </a:r>
           </a:p>
         </p:txBody>
       </p:sp>
@@ -4148,7 +4524,7 @@
 </p:sld>
 </file>
 
-<file path=ppt/slides/slide11.xml><?xml version="1.0" encoding="utf-8"?>
+<file path=ppt/slides/slide13.xml><?xml version="1.0" encoding="utf-8"?>
 <p:sld xmlns:a="http://schemas.openxmlformats.org/drawingml/2006/main" xmlns:r="http://schemas.openxmlformats.org/officeDocument/2006/relationships" xmlns:p="http://schemas.openxmlformats.org/presentationml/2006/main">
   <p:cSld>
     <p:spTree>
@@ -4251,7 +4627,7 @@
             <a:fld id="{FF73DAB7-F89A-F94F-8C5F-3F656CDF0A97}" type="slidenum">
               <a:rPr lang="en-US" smtClean="0"/>
               <a:pPr/>
-              <a:t>11</a:t>
+              <a:t>13</a:t>
             </a:fld>
             <a:endParaRPr lang="en-US"/>
           </a:p>
@@ -4295,7 +4671,7 @@
 </p:sld>
 </file>
 
-<file path=ppt/slides/slide12.xml><?xml version="1.0" encoding="utf-8"?>
+<file path=ppt/slides/slide14.xml><?xml version="1.0" encoding="utf-8"?>
 <p:sld xmlns:a="http://schemas.openxmlformats.org/drawingml/2006/main" xmlns:r="http://schemas.openxmlformats.org/officeDocument/2006/relationships" xmlns:p="http://schemas.openxmlformats.org/presentationml/2006/main">
   <p:cSld>
     <p:spTree>
@@ -4392,7 +4768,7 @@
             <a:fld id="{FF73DAB7-F89A-F94F-8C5F-3F656CDF0A97}" type="slidenum">
               <a:rPr lang="en-US" smtClean="0"/>
               <a:pPr/>
-              <a:t>12</a:t>
+              <a:t>14</a:t>
             </a:fld>
             <a:endParaRPr lang="en-US"/>
           </a:p>
@@ -4436,7 +4812,7 @@
 </p:sld>
 </file>
 
-<file path=ppt/slides/slide13.xml><?xml version="1.0" encoding="utf-8"?>
+<file path=ppt/slides/slide15.xml><?xml version="1.0" encoding="utf-8"?>
 <p:sld xmlns:a="http://schemas.openxmlformats.org/drawingml/2006/main" xmlns:r="http://schemas.openxmlformats.org/officeDocument/2006/relationships" xmlns:p="http://schemas.openxmlformats.org/presentationml/2006/main">
   <p:cSld>
     <p:spTree>
@@ -4533,7 +4909,7 @@
             <a:fld id="{FF73DAB7-F89A-F94F-8C5F-3F656CDF0A97}" type="slidenum">
               <a:rPr lang="en-US" smtClean="0"/>
               <a:pPr/>
-              <a:t>13</a:t>
+              <a:t>15</a:t>
             </a:fld>
             <a:endParaRPr lang="en-US"/>
           </a:p>
@@ -4666,23 +5042,7 @@
             </a:r>
             <a:r>
               <a:rPr lang="en-US" sz="1800" dirty="0"/>
-              <a:t>, P. Indyk, and R. Motwani, “Similarity search in high </a:t>
-            </a:r>
-            <a:r>
-              <a:rPr lang="en-US" sz="1800" dirty="0" err="1"/>
-              <a:t>dimen</a:t>
-            </a:r>
-            <a:r>
-              <a:rPr lang="en-US" sz="1800" dirty="0"/>
-              <a:t> </a:t>
-            </a:r>
-            <a:r>
-              <a:rPr lang="en-US" sz="1800" dirty="0" err="1"/>
-              <a:t>sions</a:t>
-            </a:r>
-            <a:r>
-              <a:rPr lang="en-US" sz="1800" dirty="0"/>
-              <a:t> via hashing,” Proc. Intl. Conf. on Very Large Databases, pp. 518 529, 1999</a:t>
+              <a:t>, P. Indyk, and R. Motwani, “Similarity search in high dimensions via hashing,” Proc. Intl. Conf. on Very Large Databases, pp. 518 529, 1999</a:t>
             </a:r>
           </a:p>
           <a:p>
@@ -6837,7 +7197,10 @@
               <a:rPr lang="it-IT" dirty="0" err="1"/>
               <a:t>Shingling</a:t>
             </a:r>
-            <a:endParaRPr lang="it-IT" dirty="0"/>
+            <a:r>
+              <a:rPr lang="it-IT" dirty="0"/>
+              <a:t> (1)</a:t>
+            </a:r>
           </a:p>
         </p:txBody>
       </p:sp>
@@ -6915,7 +7278,12 @@
             <p:ph idx="1"/>
           </p:nvPr>
         </p:nvSpPr>
-        <p:spPr/>
+        <p:spPr>
+          <a:xfrm>
+            <a:off x="457200" y="1562493"/>
+            <a:ext cx="8229600" cy="4525963"/>
+          </a:xfrm>
+        </p:spPr>
         <p:txBody>
           <a:bodyPr>
             <a:normAutofit/>
@@ -6932,7 +7300,103 @@
             </a:r>
             <a:r>
               <a:rPr lang="it-IT" sz="2400" dirty="0"/>
-              <a:t>: k = 9 </a:t>
+              <a:t>: w = 9  [5]</a:t>
+            </a:r>
+          </a:p>
+          <a:p>
+            <a:r>
+              <a:rPr lang="it-IT" sz="2400" dirty="0"/>
+              <a:t>Trattamento caratteri speciali (spazio, </a:t>
+            </a:r>
+            <a:r>
+              <a:rPr lang="it-IT" sz="2400" dirty="0" err="1"/>
+              <a:t>newline</a:t>
+            </a:r>
+            <a:r>
+              <a:rPr lang="it-IT" sz="2400" dirty="0"/>
+              <a:t> </a:t>
+            </a:r>
+            <a:r>
+              <a:rPr lang="it-IT" sz="2400" dirty="0" err="1"/>
+              <a:t>etc</a:t>
+            </a:r>
+            <a:r>
+              <a:rPr lang="it-IT" sz="2400" dirty="0"/>
+              <a:t>)</a:t>
+            </a:r>
+          </a:p>
+          <a:p>
+            <a:r>
+              <a:rPr lang="it-IT" sz="2400" dirty="0"/>
+              <a:t>Salvataggio delle </a:t>
+            </a:r>
+            <a:r>
+              <a:rPr lang="it-IT" sz="2400" dirty="0" err="1"/>
+              <a:t>shingles</a:t>
+            </a:r>
+            <a:r>
+              <a:rPr lang="it-IT" sz="2400" dirty="0"/>
+              <a:t>, proposte di [1]:</a:t>
+            </a:r>
+          </a:p>
+          <a:p>
+            <a:pPr lvl="1"/>
+            <a:r>
+              <a:rPr lang="it-IT" sz="2000" dirty="0"/>
+              <a:t>Salvare anche la frequenza delle </a:t>
+            </a:r>
+            <a:r>
+              <a:rPr lang="it-IT" sz="2000" dirty="0" err="1"/>
+              <a:t>shingles</a:t>
+            </a:r>
+            <a:r>
+              <a:rPr lang="it-IT" sz="2000" dirty="0"/>
+              <a:t> nel documento</a:t>
+            </a:r>
+          </a:p>
+          <a:p>
+            <a:pPr lvl="1"/>
+            <a:r>
+              <a:rPr lang="it-IT" sz="2000" dirty="0"/>
+              <a:t>Salvare solo le </a:t>
+            </a:r>
+            <a:r>
+              <a:rPr lang="it-IT" sz="2000" dirty="0" err="1"/>
+              <a:t>shingles</a:t>
+            </a:r>
+            <a:r>
+              <a:rPr lang="it-IT" sz="2000" dirty="0"/>
+              <a:t> uniche (maggiore efficienza) </a:t>
+            </a:r>
+          </a:p>
+          <a:p>
+            <a:r>
+              <a:rPr lang="it-IT" sz="2400" dirty="0"/>
+              <a:t>Hash per le </a:t>
+            </a:r>
+            <a:r>
+              <a:rPr lang="it-IT" sz="2400" dirty="0" err="1"/>
+              <a:t>shingles</a:t>
+            </a:r>
+            <a:r>
+              <a:rPr lang="it-IT" sz="2400" dirty="0"/>
+              <a:t>: compromesso tra memoria (definizione del numero di bit dell’hash) impiegata e numero di collisioni per </a:t>
+            </a:r>
+            <a:r>
+              <a:rPr lang="it-IT" sz="2400" dirty="0" err="1"/>
+              <a:t>shingles</a:t>
+            </a:r>
+            <a:r>
+              <a:rPr lang="it-IT" sz="2400" dirty="0"/>
+              <a:t> diverse. [1] consiglia di impiegare la Rabin </a:t>
+            </a:r>
+            <a:r>
+              <a:rPr lang="it-IT" sz="2400" dirty="0" err="1"/>
+              <a:t>fingerprint</a:t>
+            </a:r>
+            <a:r>
+              <a:rPr lang="it-IT" sz="2400" dirty="0"/>
+              <a:t>.</a:t>
             </a:r>
           </a:p>
         </p:txBody>
@@ -6955,13 +7419,7 @@
   <p:cSld>
     <p:spTree>
       <p:nvGrpSpPr>
-        <p:cNvPr id="1" name="">
-          <a:extLst>
-            <a:ext uri="{FF2B5EF4-FFF2-40B4-BE49-F238E27FC236}">
-              <a16:creationId xmlns:a16="http://schemas.microsoft.com/office/drawing/2014/main" id="{EE7A1980-D373-28DE-31D8-FC7216D4ECA9}"/>
-            </a:ext>
-          </a:extLst>
-        </p:cNvPr>
+        <p:cNvPr id="1" name=""/>
         <p:cNvGrpSpPr/>
         <p:nvPr/>
       </p:nvGrpSpPr>
@@ -6975,10 +7433,10 @@
       </p:grpSpPr>
       <p:sp>
         <p:nvSpPr>
-          <p:cNvPr id="2" name="Title 1">
+          <p:cNvPr id="2" name="Titolo 1">
             <a:extLst>
               <a:ext uri="{FF2B5EF4-FFF2-40B4-BE49-F238E27FC236}">
-                <a16:creationId xmlns:a16="http://schemas.microsoft.com/office/drawing/2014/main" id="{A7053784-8BAC-28C2-9CAA-C9963985401E}"/>
+                <a16:creationId xmlns:a16="http://schemas.microsoft.com/office/drawing/2014/main" id="{A090C56D-29A0-EF43-6316-9E849584A8AC}"/>
               </a:ext>
             </a:extLst>
           </p:cNvPr>
@@ -6996,18 +7454,21 @@
           <a:p>
             <a:r>
               <a:rPr lang="it-IT" dirty="0" err="1"/>
-              <a:t>MinHash</a:t>
-            </a:r>
-            <a:endParaRPr lang="it-IT" dirty="0"/>
-          </a:p>
-        </p:txBody>
-      </p:sp>
-      <p:sp>
-        <p:nvSpPr>
-          <p:cNvPr id="4" name="Footer Placeholder 3">
+              <a:t>Shingling</a:t>
+            </a:r>
+            <a:r>
+              <a:rPr lang="it-IT" dirty="0"/>
+              <a:t> (2)</a:t>
+            </a:r>
+          </a:p>
+        </p:txBody>
+      </p:sp>
+      <p:sp>
+        <p:nvSpPr>
+          <p:cNvPr id="4" name="Segnaposto piè di pagina 3">
             <a:extLst>
               <a:ext uri="{FF2B5EF4-FFF2-40B4-BE49-F238E27FC236}">
-                <a16:creationId xmlns:a16="http://schemas.microsoft.com/office/drawing/2014/main" id="{A2F11FE3-1D08-0BA9-5DDD-58A873025931}"/>
+                <a16:creationId xmlns:a16="http://schemas.microsoft.com/office/drawing/2014/main" id="{62F23097-9057-0F8B-66D9-54B2F9AD4DDD}"/>
               </a:ext>
             </a:extLst>
           </p:cNvPr>
@@ -7025,17 +7486,17 @@
           <a:p>
             <a:r>
               <a:rPr lang="en-US"/>
-              <a:t>Laurea SS - MIDST– 2023/2024</a:t>
-            </a:r>
-          </a:p>
-        </p:txBody>
-      </p:sp>
-      <p:sp>
-        <p:nvSpPr>
-          <p:cNvPr id="5" name="Slide Number Placeholder 4">
+              <a:t>Laurea SS - MIDST– 2023/2024 </a:t>
+            </a:r>
+          </a:p>
+        </p:txBody>
+      </p:sp>
+      <p:sp>
+        <p:nvSpPr>
+          <p:cNvPr id="5" name="Segnaposto numero diapositiva 4">
             <a:extLst>
               <a:ext uri="{FF2B5EF4-FFF2-40B4-BE49-F238E27FC236}">
-                <a16:creationId xmlns:a16="http://schemas.microsoft.com/office/drawing/2014/main" id="{F5FC3FAC-BB59-5865-A349-D2501A74B54A}"/>
+                <a16:creationId xmlns:a16="http://schemas.microsoft.com/office/drawing/2014/main" id="{0D519249-364B-4034-F964-0FCFD26E23B2}"/>
               </a:ext>
             </a:extLst>
           </p:cNvPr>
@@ -7062,10 +7523,10 @@
       </p:sp>
       <p:sp>
         <p:nvSpPr>
-          <p:cNvPr id="7" name="Segnaposto contenuto 6">
+          <p:cNvPr id="8" name="Segnaposto contenuto 6">
             <a:extLst>
               <a:ext uri="{FF2B5EF4-FFF2-40B4-BE49-F238E27FC236}">
-                <a16:creationId xmlns:a16="http://schemas.microsoft.com/office/drawing/2014/main" id="{17A1019C-96CC-D4E4-8BC7-02DC7FB35CF2}"/>
+                <a16:creationId xmlns:a16="http://schemas.microsoft.com/office/drawing/2014/main" id="{30AACAF1-0A2F-B1D4-B3C2-CAB5424964F6}"/>
               </a:ext>
             </a:extLst>
           </p:cNvPr>
@@ -7076,19 +7537,146 @@
             <p:ph idx="1"/>
           </p:nvPr>
         </p:nvSpPr>
-        <p:spPr/>
-        <p:txBody>
-          <a:bodyPr/>
+        <p:spPr>
+          <a:xfrm>
+            <a:off x="457200" y="1562493"/>
+            <a:ext cx="8517118" cy="5158982"/>
+          </a:xfrm>
+        </p:spPr>
+        <p:txBody>
+          <a:bodyPr>
+            <a:normAutofit lnSpcReduction="10000"/>
+          </a:bodyPr>
           <a:lstStyle/>
           <a:p>
-            <a:endParaRPr lang="it-IT" dirty="0"/>
+            <a:r>
+              <a:rPr lang="it-IT" sz="2400" dirty="0"/>
+              <a:t>Struttura dati per salvare le </a:t>
+            </a:r>
+            <a:r>
+              <a:rPr lang="it-IT" sz="2400" dirty="0" err="1"/>
+              <a:t>shingles</a:t>
+            </a:r>
+            <a:r>
+              <a:rPr lang="it-IT" sz="2400" dirty="0"/>
+              <a:t> (i loro hash): l’insieme delle </a:t>
+            </a:r>
+            <a:r>
+              <a:rPr lang="it-IT" sz="2400" dirty="0" err="1"/>
+              <a:t>shingles</a:t>
+            </a:r>
+            <a:r>
+              <a:rPr lang="it-IT" sz="2400" dirty="0"/>
+              <a:t> è temporaneo, serve solo per calcolare la signature, poi è eliminato</a:t>
+            </a:r>
+          </a:p>
+          <a:p>
+            <a:pPr lvl="1"/>
+            <a:r>
+              <a:rPr lang="it-IT" sz="2000" dirty="0"/>
+              <a:t>Lista ordinata:</a:t>
+            </a:r>
+          </a:p>
+          <a:p>
+            <a:pPr lvl="2"/>
+            <a:r>
+              <a:rPr lang="it-IT" sz="1600" dirty="0"/>
+              <a:t>Pro: occupa poca memoria O(n)</a:t>
+            </a:r>
+          </a:p>
+          <a:p>
+            <a:pPr lvl="2"/>
+            <a:r>
+              <a:rPr lang="it-IT" sz="1600" dirty="0"/>
+              <a:t>Contro: per ordinarla la complessità è O(n * log(n))</a:t>
+            </a:r>
+          </a:p>
+          <a:p>
+            <a:pPr lvl="2"/>
+            <a:r>
+              <a:rPr lang="it-IT" sz="1600" dirty="0"/>
+              <a:t>Neutrale: ricerca di un elemento in  O(log(n)) (</a:t>
+            </a:r>
+            <a:r>
+              <a:rPr lang="it-IT" sz="1600" dirty="0" err="1"/>
+              <a:t>binary</a:t>
+            </a:r>
+            <a:r>
+              <a:rPr lang="it-IT" sz="1600" dirty="0"/>
+              <a:t> </a:t>
+            </a:r>
+            <a:r>
+              <a:rPr lang="it-IT" sz="1600" dirty="0" err="1"/>
+              <a:t>search</a:t>
+            </a:r>
+            <a:r>
+              <a:rPr lang="it-IT" sz="1600" dirty="0"/>
+              <a:t>)</a:t>
+            </a:r>
+          </a:p>
+          <a:p>
+            <a:pPr lvl="1"/>
+            <a:r>
+              <a:rPr lang="it-IT" sz="2000" dirty="0"/>
+              <a:t>Hash list</a:t>
+            </a:r>
+          </a:p>
+          <a:p>
+            <a:pPr lvl="2"/>
+            <a:r>
+              <a:rPr lang="it-IT" sz="1600" dirty="0"/>
+              <a:t>Pro: ricerca in O(1)</a:t>
+            </a:r>
+          </a:p>
+          <a:p>
+            <a:pPr lvl="2"/>
+            <a:r>
+              <a:rPr lang="it-IT" sz="1600" dirty="0"/>
+              <a:t>Contro: (se in media vogliamo la ricerca in O(1)) deve occupare molta memoria (celle vuote in circa il 70 % delle posizioni)</a:t>
+            </a:r>
+          </a:p>
+          <a:p>
+            <a:pPr lvl="1"/>
+            <a:r>
+              <a:rPr lang="it-IT" sz="2000" dirty="0" err="1"/>
+              <a:t>Balanced-tree</a:t>
+            </a:r>
+            <a:endParaRPr lang="it-IT" sz="2000" dirty="0"/>
+          </a:p>
+          <a:p>
+            <a:pPr lvl="2"/>
+            <a:r>
+              <a:rPr lang="it-IT" sz="1600" dirty="0"/>
+              <a:t>Pro: occupa poco spazio</a:t>
+            </a:r>
+          </a:p>
+          <a:p>
+            <a:pPr lvl="2"/>
+            <a:r>
+              <a:rPr lang="it-IT" sz="1600" dirty="0"/>
+              <a:t>Pro: inserimento / ordinamento in in O(log(n))</a:t>
+            </a:r>
+          </a:p>
+          <a:p>
+            <a:pPr lvl="2"/>
+            <a:r>
+              <a:rPr lang="it-IT" sz="1600" dirty="0"/>
+              <a:t>Neutrale: ricerca in O(log(n))</a:t>
+            </a:r>
+          </a:p>
+          <a:p>
+            <a:pPr lvl="2"/>
+            <a:r>
+              <a:rPr lang="it-IT" sz="1600" dirty="0"/>
+              <a:t>Neutrale: l’operazione di scrittura avviene un’unica volta e gli elementi contenuti non sono moltissimi</a:t>
+            </a:r>
           </a:p>
         </p:txBody>
       </p:sp>
     </p:spTree>
     <p:extLst>
       <p:ext uri="{BB962C8B-B14F-4D97-AF65-F5344CB8AC3E}">
-        <p14:creationId xmlns:p14="http://schemas.microsoft.com/office/powerpoint/2010/main" val="927308424"/>
+        <p14:creationId xmlns:p14="http://schemas.microsoft.com/office/powerpoint/2010/main" val="2043850614"/>
       </p:ext>
     </p:extLst>
   </p:cSld>

</xml_diff>

<commit_message>
In functions, in the shingling functions removed the option to not hash the just created shingles due to resource optimization for large inputs; slides updated about signatures creation
</commit_message>
<xml_diff>
--- a/slides/ita/slides_ita.pptx
+++ b/slides/ita/slides_ita.pptx
@@ -4134,7 +4134,7 @@
         <p:spPr/>
         <p:txBody>
           <a:bodyPr>
-            <a:normAutofit/>
+            <a:normAutofit lnSpcReduction="10000"/>
           </a:bodyPr>
           <a:lstStyle/>
           <a:p>
@@ -4182,7 +4182,15 @@
             </a:r>
             <a:r>
               <a:rPr lang="it-IT" sz="2400" dirty="0"/>
-              <a:t>: valutare se tenere in memoria m dizionari (tante quante sono le funzioni hash di permutazione) oppure mantenere in memoria le </a:t>
+              <a:t>: valutare se tenere in memoria un dizionario con valori di vettori di </a:t>
+            </a:r>
+            <a:r>
+              <a:rPr lang="it-IT" sz="2400"/>
+              <a:t>k vettori (tanti </a:t>
+            </a:r>
+            <a:r>
+              <a:rPr lang="it-IT" sz="2400" dirty="0"/>
+              <a:t>quante sono le funzioni hash di permutazione) oppure mantenere in memoria le </a:t>
             </a:r>
             <a:r>
               <a:rPr lang="it-IT" sz="2400" dirty="0" err="1"/>

</xml_diff>

<commit_message>
added slides about experimental collection creations and LSH
</commit_message>
<xml_diff>
--- a/slides/ita/slides_ita.pptx
+++ b/slides/ita/slides_ita.pptx
@@ -6,7 +6,7 @@
     <p:sldMasterId id="2147483665" r:id="rId2"/>
   </p:sldMasterIdLst>
   <p:notesMasterIdLst>
-    <p:notesMasterId r:id="rId18"/>
+    <p:notesMasterId r:id="rId19"/>
   </p:notesMasterIdLst>
   <p:sldIdLst>
     <p:sldId id="256" r:id="rId3"/>
@@ -16,14 +16,15 @@
     <p:sldId id="258" r:id="rId7"/>
     <p:sldId id="262" r:id="rId8"/>
     <p:sldId id="275" r:id="rId9"/>
-    <p:sldId id="273" r:id="rId10"/>
-    <p:sldId id="279" r:id="rId11"/>
-    <p:sldId id="277" r:id="rId12"/>
-    <p:sldId id="280" r:id="rId13"/>
-    <p:sldId id="278" r:id="rId14"/>
-    <p:sldId id="276" r:id="rId15"/>
-    <p:sldId id="270" r:id="rId16"/>
-    <p:sldId id="271" r:id="rId17"/>
+    <p:sldId id="281" r:id="rId10"/>
+    <p:sldId id="273" r:id="rId11"/>
+    <p:sldId id="279" r:id="rId12"/>
+    <p:sldId id="277" r:id="rId13"/>
+    <p:sldId id="280" r:id="rId14"/>
+    <p:sldId id="278" r:id="rId15"/>
+    <p:sldId id="276" r:id="rId16"/>
+    <p:sldId id="270" r:id="rId17"/>
+    <p:sldId id="271" r:id="rId18"/>
   </p:sldIdLst>
   <p:sldSz cx="9144000" cy="6858000" type="screen4x3"/>
   <p:notesSz cx="6858000" cy="9144000"/>
@@ -1261,7 +1262,7 @@
             <a:fld id="{46E5C021-FA02-7D4A-9AAB-ABFA99521826}" type="datetimeFigureOut">
               <a:rPr lang="it-IT" smtClean="0"/>
               <a:pPr/>
-              <a:t>16/02/2024</a:t>
+              <a:t>21/02/2024</a:t>
             </a:fld>
             <a:endParaRPr lang="en-US"/>
           </a:p>
@@ -1471,7 +1472,7 @@
             <a:fld id="{46E5C021-FA02-7D4A-9AAB-ABFA99521826}" type="datetimeFigureOut">
               <a:rPr lang="it-IT" smtClean="0"/>
               <a:pPr/>
-              <a:t>16/02/2024</a:t>
+              <a:t>21/02/2024</a:t>
             </a:fld>
             <a:endParaRPr lang="en-US"/>
           </a:p>
@@ -2162,7 +2163,7 @@
             <a:fld id="{46E5C021-FA02-7D4A-9AAB-ABFA99521826}" type="datetimeFigureOut">
               <a:rPr lang="it-IT" smtClean="0"/>
               <a:pPr/>
-              <a:t>16/02/2024</a:t>
+              <a:t>21/02/2024</a:t>
             </a:fld>
             <a:endParaRPr lang="en-US"/>
           </a:p>
@@ -2377,7 +2378,7 @@
             <a:fld id="{46E5C021-FA02-7D4A-9AAB-ABFA99521826}" type="datetimeFigureOut">
               <a:rPr lang="it-IT" smtClean="0"/>
               <a:pPr/>
-              <a:t>16/02/2024</a:t>
+              <a:t>21/02/2024</a:t>
             </a:fld>
             <a:endParaRPr lang="en-US"/>
           </a:p>
@@ -2685,7 +2686,7 @@
             <a:fld id="{46E5C021-FA02-7D4A-9AAB-ABFA99521826}" type="datetimeFigureOut">
               <a:rPr lang="it-IT" smtClean="0"/>
               <a:pPr/>
-              <a:t>16/02/2024</a:t>
+              <a:t>21/02/2024</a:t>
             </a:fld>
             <a:endParaRPr lang="en-US"/>
           </a:p>
@@ -3296,7 +3297,7 @@
             <a:fld id="{46E5C021-FA02-7D4A-9AAB-ABFA99521826}" type="datetimeFigureOut">
               <a:rPr lang="it-IT" smtClean="0"/>
               <a:pPr/>
-              <a:t>16/02/2024</a:t>
+              <a:t>21/02/2024</a:t>
             </a:fld>
             <a:endParaRPr lang="en-US"/>
           </a:p>
@@ -4007,6 +4008,242 @@
   <p:cSld>
     <p:spTree>
       <p:nvGrpSpPr>
+        <p:cNvPr id="1" name=""/>
+        <p:cNvGrpSpPr/>
+        <p:nvPr/>
+      </p:nvGrpSpPr>
+      <p:grpSpPr>
+        <a:xfrm>
+          <a:off x="0" y="0"/>
+          <a:ext cx="0" cy="0"/>
+          <a:chOff x="0" y="0"/>
+          <a:chExt cx="0" cy="0"/>
+        </a:xfrm>
+      </p:grpSpPr>
+      <p:sp>
+        <p:nvSpPr>
+          <p:cNvPr id="2" name="Titolo 1">
+            <a:extLst>
+              <a:ext uri="{FF2B5EF4-FFF2-40B4-BE49-F238E27FC236}">
+                <a16:creationId xmlns:a16="http://schemas.microsoft.com/office/drawing/2014/main" id="{A090C56D-29A0-EF43-6316-9E849584A8AC}"/>
+              </a:ext>
+            </a:extLst>
+          </p:cNvPr>
+          <p:cNvSpPr>
+            <a:spLocks noGrp="1"/>
+          </p:cNvSpPr>
+          <p:nvPr>
+            <p:ph type="title"/>
+          </p:nvPr>
+        </p:nvSpPr>
+        <p:spPr/>
+        <p:txBody>
+          <a:bodyPr/>
+          <a:lstStyle/>
+          <a:p>
+            <a:r>
+              <a:rPr lang="it-IT" dirty="0" err="1"/>
+              <a:t>Shingling</a:t>
+            </a:r>
+            <a:r>
+              <a:rPr lang="it-IT" dirty="0"/>
+              <a:t> (2)</a:t>
+            </a:r>
+          </a:p>
+        </p:txBody>
+      </p:sp>
+      <p:sp>
+        <p:nvSpPr>
+          <p:cNvPr id="4" name="Segnaposto piè di pagina 3">
+            <a:extLst>
+              <a:ext uri="{FF2B5EF4-FFF2-40B4-BE49-F238E27FC236}">
+                <a16:creationId xmlns:a16="http://schemas.microsoft.com/office/drawing/2014/main" id="{62F23097-9057-0F8B-66D9-54B2F9AD4DDD}"/>
+              </a:ext>
+            </a:extLst>
+          </p:cNvPr>
+          <p:cNvSpPr>
+            <a:spLocks noGrp="1"/>
+          </p:cNvSpPr>
+          <p:nvPr>
+            <p:ph type="ftr" sz="quarter" idx="11"/>
+          </p:nvPr>
+        </p:nvSpPr>
+        <p:spPr/>
+        <p:txBody>
+          <a:bodyPr/>
+          <a:lstStyle/>
+          <a:p>
+            <a:r>
+              <a:rPr lang="en-US"/>
+              <a:t>Laurea SS - MIDST– 2023/2024 </a:t>
+            </a:r>
+          </a:p>
+        </p:txBody>
+      </p:sp>
+      <p:sp>
+        <p:nvSpPr>
+          <p:cNvPr id="5" name="Segnaposto numero diapositiva 4">
+            <a:extLst>
+              <a:ext uri="{FF2B5EF4-FFF2-40B4-BE49-F238E27FC236}">
+                <a16:creationId xmlns:a16="http://schemas.microsoft.com/office/drawing/2014/main" id="{0D519249-364B-4034-F964-0FCFD26E23B2}"/>
+              </a:ext>
+            </a:extLst>
+          </p:cNvPr>
+          <p:cNvSpPr>
+            <a:spLocks noGrp="1"/>
+          </p:cNvSpPr>
+          <p:nvPr>
+            <p:ph type="sldNum" sz="quarter" idx="12"/>
+          </p:nvPr>
+        </p:nvSpPr>
+        <p:spPr/>
+        <p:txBody>
+          <a:bodyPr/>
+          <a:lstStyle/>
+          <a:p>
+            <a:fld id="{FF73DAB7-F89A-F94F-8C5F-3F656CDF0A97}" type="slidenum">
+              <a:rPr lang="en-US" smtClean="0"/>
+              <a:pPr/>
+              <a:t>10</a:t>
+            </a:fld>
+            <a:endParaRPr lang="en-US"/>
+          </a:p>
+        </p:txBody>
+      </p:sp>
+      <p:sp>
+        <p:nvSpPr>
+          <p:cNvPr id="8" name="Segnaposto contenuto 6">
+            <a:extLst>
+              <a:ext uri="{FF2B5EF4-FFF2-40B4-BE49-F238E27FC236}">
+                <a16:creationId xmlns:a16="http://schemas.microsoft.com/office/drawing/2014/main" id="{30AACAF1-0A2F-B1D4-B3C2-CAB5424964F6}"/>
+              </a:ext>
+            </a:extLst>
+          </p:cNvPr>
+          <p:cNvSpPr>
+            <a:spLocks noGrp="1"/>
+          </p:cNvSpPr>
+          <p:nvPr>
+            <p:ph idx="1"/>
+          </p:nvPr>
+        </p:nvSpPr>
+        <p:spPr>
+          <a:xfrm>
+            <a:off x="457200" y="1562493"/>
+            <a:ext cx="8517118" cy="5158982"/>
+          </a:xfrm>
+        </p:spPr>
+        <p:txBody>
+          <a:bodyPr>
+            <a:normAutofit/>
+          </a:bodyPr>
+          <a:lstStyle/>
+          <a:p>
+            <a:r>
+              <a:rPr lang="it-IT" sz="2400" dirty="0"/>
+              <a:t>Struttura dati per salvare le </a:t>
+            </a:r>
+            <a:r>
+              <a:rPr lang="it-IT" sz="2400" dirty="0" err="1"/>
+              <a:t>shingles</a:t>
+            </a:r>
+            <a:r>
+              <a:rPr lang="it-IT" sz="2400" dirty="0"/>
+              <a:t> (i loro hash): l’insieme delle </a:t>
+            </a:r>
+            <a:r>
+              <a:rPr lang="it-IT" sz="2400" dirty="0" err="1"/>
+              <a:t>shingles</a:t>
+            </a:r>
+            <a:r>
+              <a:rPr lang="it-IT" sz="2400" dirty="0"/>
+              <a:t> è temporaneo, serve solo per calcolare la signature, poi è eliminato</a:t>
+            </a:r>
+          </a:p>
+          <a:p>
+            <a:pPr lvl="1"/>
+            <a:r>
+              <a:rPr lang="it-IT" sz="2000" dirty="0"/>
+              <a:t>Lista ordinata:</a:t>
+            </a:r>
+          </a:p>
+          <a:p>
+            <a:pPr lvl="2"/>
+            <a:r>
+              <a:rPr lang="it-IT" sz="1600" dirty="0"/>
+              <a:t>Pro: occupa poca memoria O(n)</a:t>
+            </a:r>
+          </a:p>
+          <a:p>
+            <a:pPr lvl="2"/>
+            <a:r>
+              <a:rPr lang="it-IT" sz="1600" dirty="0"/>
+              <a:t>Contro: per ordinarla la complessità è O(n * log(n))</a:t>
+            </a:r>
+          </a:p>
+          <a:p>
+            <a:pPr lvl="2"/>
+            <a:r>
+              <a:rPr lang="it-IT" sz="1600" dirty="0"/>
+              <a:t>Neutrale: ricerca di un elemento in  O(log(n)) (</a:t>
+            </a:r>
+            <a:r>
+              <a:rPr lang="it-IT" sz="1600" dirty="0" err="1"/>
+              <a:t>binary</a:t>
+            </a:r>
+            <a:r>
+              <a:rPr lang="it-IT" sz="1600" dirty="0"/>
+              <a:t> </a:t>
+            </a:r>
+            <a:r>
+              <a:rPr lang="it-IT" sz="1600" dirty="0" err="1"/>
+              <a:t>search</a:t>
+            </a:r>
+            <a:r>
+              <a:rPr lang="it-IT" sz="1600" dirty="0"/>
+              <a:t>)</a:t>
+            </a:r>
+          </a:p>
+          <a:p>
+            <a:pPr lvl="1"/>
+            <a:r>
+              <a:rPr lang="it-IT" sz="2000" dirty="0"/>
+              <a:t>Hash list</a:t>
+            </a:r>
+          </a:p>
+          <a:p>
+            <a:pPr lvl="2"/>
+            <a:r>
+              <a:rPr lang="it-IT" sz="1600" dirty="0"/>
+              <a:t>Pro: ricerca in O(1)</a:t>
+            </a:r>
+          </a:p>
+          <a:p>
+            <a:pPr lvl="2"/>
+            <a:r>
+              <a:rPr lang="it-IT" sz="1600" dirty="0"/>
+              <a:t>Contro: (se in media vogliamo la ricerca in O(1)) deve occupare molta memoria (celle vuote in circa il 70 % delle posizioni)</a:t>
+            </a:r>
+          </a:p>
+        </p:txBody>
+      </p:sp>
+    </p:spTree>
+    <p:extLst>
+      <p:ext uri="{BB962C8B-B14F-4D97-AF65-F5344CB8AC3E}">
+        <p14:creationId xmlns:p14="http://schemas.microsoft.com/office/powerpoint/2010/main" val="2043850614"/>
+      </p:ext>
+    </p:extLst>
+  </p:cSld>
+  <p:clrMapOvr>
+    <a:masterClrMapping/>
+  </p:clrMapOvr>
+</p:sld>
+</file>
+
+<file path=ppt/slides/slide11.xml><?xml version="1.0" encoding="utf-8"?>
+<p:sld xmlns:a="http://schemas.openxmlformats.org/drawingml/2006/main" xmlns:r="http://schemas.openxmlformats.org/officeDocument/2006/relationships" xmlns:p="http://schemas.openxmlformats.org/presentationml/2006/main">
+  <p:cSld>
+    <p:spTree>
+      <p:nvGrpSpPr>
         <p:cNvPr id="1" name="">
           <a:extLst>
             <a:ext uri="{FF2B5EF4-FFF2-40B4-BE49-F238E27FC236}">
@@ -4109,7 +4346,7 @@
             <a:fld id="{FF73DAB7-F89A-F94F-8C5F-3F656CDF0A97}" type="slidenum">
               <a:rPr lang="en-US" smtClean="0"/>
               <a:pPr/>
-              <a:t>10</a:t>
+              <a:t>11</a:t>
             </a:fld>
             <a:endParaRPr lang="en-US"/>
           </a:p>
@@ -4216,7 +4453,7 @@
 </p:sld>
 </file>
 
-<file path=ppt/slides/slide11.xml><?xml version="1.0" encoding="utf-8"?>
+<file path=ppt/slides/slide12.xml><?xml version="1.0" encoding="utf-8"?>
 <p:sld xmlns:a="http://schemas.openxmlformats.org/drawingml/2006/main" xmlns:r="http://schemas.openxmlformats.org/officeDocument/2006/relationships" xmlns:p="http://schemas.openxmlformats.org/presentationml/2006/main">
   <p:cSld>
     <p:spTree>
@@ -4324,7 +4561,7 @@
             <a:fld id="{FF73DAB7-F89A-F94F-8C5F-3F656CDF0A97}" type="slidenum">
               <a:rPr lang="en-US" smtClean="0"/>
               <a:pPr/>
-              <a:t>11</a:t>
+              <a:t>12</a:t>
             </a:fld>
             <a:endParaRPr lang="en-US"/>
           </a:p>
@@ -4381,7 +4618,7 @@
 </p:sld>
 </file>
 
-<file path=ppt/slides/slide12.xml><?xml version="1.0" encoding="utf-8"?>
+<file path=ppt/slides/slide13.xml><?xml version="1.0" encoding="utf-8"?>
 <p:sld xmlns:a="http://schemas.openxmlformats.org/drawingml/2006/main" xmlns:r="http://schemas.openxmlformats.org/officeDocument/2006/relationships" xmlns:p="http://schemas.openxmlformats.org/presentationml/2006/main">
   <p:cSld>
     <p:spTree>
@@ -4485,7 +4722,7 @@
             <a:fld id="{FF73DAB7-F89A-F94F-8C5F-3F656CDF0A97}" type="slidenum">
               <a:rPr lang="en-US" smtClean="0"/>
               <a:pPr/>
-              <a:t>12</a:t>
+              <a:t>13</a:t>
             </a:fld>
             <a:endParaRPr lang="en-US"/>
           </a:p>
@@ -4537,6 +4774,58 @@
             <a:r>
               <a:rPr lang="it-IT" sz="2400" dirty="0"/>
               <a:t> dove ad ogni chiave è associata una lista con gli id dei documenti</a:t>
+            </a:r>
+          </a:p>
+          <a:p>
+            <a:r>
+              <a:rPr lang="it-IT" sz="2400" dirty="0"/>
+              <a:t>Diverse implementazioni: </a:t>
+            </a:r>
+          </a:p>
+          <a:p>
+            <a:pPr lvl="1"/>
+            <a:r>
+              <a:rPr lang="it-IT" sz="2000" dirty="0"/>
+              <a:t>in memoria centrale</a:t>
+            </a:r>
+          </a:p>
+          <a:p>
+            <a:pPr lvl="2"/>
+            <a:r>
+              <a:rPr lang="it-IT" sz="1600" dirty="0"/>
+              <a:t>Hash-</a:t>
+            </a:r>
+            <a:r>
+              <a:rPr lang="it-IT" sz="1600" dirty="0" err="1"/>
+              <a:t>table</a:t>
+            </a:r>
+            <a:endParaRPr lang="it-IT" sz="1600" dirty="0"/>
+          </a:p>
+          <a:p>
+            <a:pPr lvl="2"/>
+            <a:r>
+              <a:rPr lang="it-IT" sz="1600" dirty="0"/>
+              <a:t>Hash-</a:t>
+            </a:r>
+            <a:r>
+              <a:rPr lang="it-IT" sz="1600" dirty="0" err="1"/>
+              <a:t>tree</a:t>
+            </a:r>
+            <a:r>
+              <a:rPr lang="it-IT" sz="1600" dirty="0"/>
+              <a:t> o b-</a:t>
+            </a:r>
+            <a:r>
+              <a:rPr lang="it-IT" sz="1600" dirty="0" err="1"/>
+              <a:t>tree</a:t>
+            </a:r>
+            <a:endParaRPr lang="it-IT" sz="1600" dirty="0"/>
+          </a:p>
+          <a:p>
+            <a:pPr lvl="1"/>
+            <a:r>
+              <a:rPr lang="it-IT" sz="2000" dirty="0"/>
+              <a:t>In memoria di massa</a:t>
             </a:r>
           </a:p>
         </p:txBody>
@@ -4554,7 +4843,7 @@
 </p:sld>
 </file>
 
-<file path=ppt/slides/slide13.xml><?xml version="1.0" encoding="utf-8"?>
+<file path=ppt/slides/slide14.xml><?xml version="1.0" encoding="utf-8"?>
 <p:sld xmlns:a="http://schemas.openxmlformats.org/drawingml/2006/main" xmlns:r="http://schemas.openxmlformats.org/officeDocument/2006/relationships" xmlns:p="http://schemas.openxmlformats.org/presentationml/2006/main">
   <p:cSld>
     <p:spTree>
@@ -4657,7 +4946,7 @@
             <a:fld id="{FF73DAB7-F89A-F94F-8C5F-3F656CDF0A97}" type="slidenum">
               <a:rPr lang="en-US" smtClean="0"/>
               <a:pPr/>
-              <a:t>13</a:t>
+              <a:t>14</a:t>
             </a:fld>
             <a:endParaRPr lang="en-US"/>
           </a:p>
@@ -4681,10 +4970,21 @@
         </p:nvSpPr>
         <p:spPr/>
         <p:txBody>
-          <a:bodyPr/>
+          <a:bodyPr>
+            <a:normAutofit/>
+          </a:bodyPr>
           <a:lstStyle/>
           <a:p>
-            <a:endParaRPr lang="it-IT" dirty="0"/>
+            <a:r>
+              <a:rPr lang="it-IT" sz="2400" dirty="0"/>
+              <a:t>Prima esecuzione della procedura sul dataset originale (senza semi-duplicati artificiali) per tarare i parametri</a:t>
+            </a:r>
+          </a:p>
+          <a:p>
+            <a:r>
+              <a:rPr lang="it-IT" sz="2400" dirty="0"/>
+              <a:t>Esecuzioni successive con diversi livelli di modifica dei documenti semi-duplicati artificiali</a:t>
+            </a:r>
           </a:p>
         </p:txBody>
       </p:sp>
@@ -4692,147 +4992,6 @@
     <p:extLst>
       <p:ext uri="{BB962C8B-B14F-4D97-AF65-F5344CB8AC3E}">
         <p14:creationId xmlns:p14="http://schemas.microsoft.com/office/powerpoint/2010/main" val="2304361174"/>
-      </p:ext>
-    </p:extLst>
-  </p:cSld>
-  <p:clrMapOvr>
-    <a:masterClrMapping/>
-  </p:clrMapOvr>
-</p:sld>
-</file>
-
-<file path=ppt/slides/slide14.xml><?xml version="1.0" encoding="utf-8"?>
-<p:sld xmlns:a="http://schemas.openxmlformats.org/drawingml/2006/main" xmlns:r="http://schemas.openxmlformats.org/officeDocument/2006/relationships" xmlns:p="http://schemas.openxmlformats.org/presentationml/2006/main">
-  <p:cSld>
-    <p:spTree>
-      <p:nvGrpSpPr>
-        <p:cNvPr id="1" name=""/>
-        <p:cNvGrpSpPr/>
-        <p:nvPr/>
-      </p:nvGrpSpPr>
-      <p:grpSpPr>
-        <a:xfrm>
-          <a:off x="0" y="0"/>
-          <a:ext cx="0" cy="0"/>
-          <a:chOff x="0" y="0"/>
-          <a:chExt cx="0" cy="0"/>
-        </a:xfrm>
-      </p:grpSpPr>
-      <p:sp>
-        <p:nvSpPr>
-          <p:cNvPr id="2" name="Title 1">
-            <a:extLst>
-              <a:ext uri="{FF2B5EF4-FFF2-40B4-BE49-F238E27FC236}">
-                <a16:creationId xmlns:a16="http://schemas.microsoft.com/office/drawing/2014/main" id="{AEC5A80E-581C-1B46-9C70-7C00331B9233}"/>
-              </a:ext>
-            </a:extLst>
-          </p:cNvPr>
-          <p:cNvSpPr>
-            <a:spLocks noGrp="1"/>
-          </p:cNvSpPr>
-          <p:nvPr>
-            <p:ph type="title"/>
-          </p:nvPr>
-        </p:nvSpPr>
-        <p:spPr/>
-        <p:txBody>
-          <a:bodyPr/>
-          <a:lstStyle/>
-          <a:p>
-            <a:r>
-              <a:rPr lang="it-IT"/>
-              <a:t>Conclusioni</a:t>
-            </a:r>
-          </a:p>
-        </p:txBody>
-      </p:sp>
-      <p:sp>
-        <p:nvSpPr>
-          <p:cNvPr id="4" name="Footer Placeholder 3">
-            <a:extLst>
-              <a:ext uri="{FF2B5EF4-FFF2-40B4-BE49-F238E27FC236}">
-                <a16:creationId xmlns:a16="http://schemas.microsoft.com/office/drawing/2014/main" id="{D46AA9DE-DDA7-E54C-A21C-54B9077604CB}"/>
-              </a:ext>
-            </a:extLst>
-          </p:cNvPr>
-          <p:cNvSpPr>
-            <a:spLocks noGrp="1"/>
-          </p:cNvSpPr>
-          <p:nvPr>
-            <p:ph type="ftr" sz="quarter" idx="11"/>
-          </p:nvPr>
-        </p:nvSpPr>
-        <p:spPr/>
-        <p:txBody>
-          <a:bodyPr/>
-          <a:lstStyle/>
-          <a:p>
-            <a:r>
-              <a:rPr lang="en-US"/>
-              <a:t>Laurea SS - MIDST– 2023/2024</a:t>
-            </a:r>
-          </a:p>
-        </p:txBody>
-      </p:sp>
-      <p:sp>
-        <p:nvSpPr>
-          <p:cNvPr id="5" name="Slide Number Placeholder 4">
-            <a:extLst>
-              <a:ext uri="{FF2B5EF4-FFF2-40B4-BE49-F238E27FC236}">
-                <a16:creationId xmlns:a16="http://schemas.microsoft.com/office/drawing/2014/main" id="{18BC653A-704D-8348-9299-88A813BA2A97}"/>
-              </a:ext>
-            </a:extLst>
-          </p:cNvPr>
-          <p:cNvSpPr>
-            <a:spLocks noGrp="1"/>
-          </p:cNvSpPr>
-          <p:nvPr>
-            <p:ph type="sldNum" sz="quarter" idx="12"/>
-          </p:nvPr>
-        </p:nvSpPr>
-        <p:spPr/>
-        <p:txBody>
-          <a:bodyPr/>
-          <a:lstStyle/>
-          <a:p>
-            <a:fld id="{FF73DAB7-F89A-F94F-8C5F-3F656CDF0A97}" type="slidenum">
-              <a:rPr lang="en-US" smtClean="0"/>
-              <a:pPr/>
-              <a:t>14</a:t>
-            </a:fld>
-            <a:endParaRPr lang="en-US"/>
-          </a:p>
-        </p:txBody>
-      </p:sp>
-      <p:sp>
-        <p:nvSpPr>
-          <p:cNvPr id="7" name="Segnaposto contenuto 6">
-            <a:extLst>
-              <a:ext uri="{FF2B5EF4-FFF2-40B4-BE49-F238E27FC236}">
-                <a16:creationId xmlns:a16="http://schemas.microsoft.com/office/drawing/2014/main" id="{513B8653-E432-27B5-7A84-AD903EA7535E}"/>
-              </a:ext>
-            </a:extLst>
-          </p:cNvPr>
-          <p:cNvSpPr>
-            <a:spLocks noGrp="1"/>
-          </p:cNvSpPr>
-          <p:nvPr>
-            <p:ph idx="1"/>
-          </p:nvPr>
-        </p:nvSpPr>
-        <p:spPr/>
-        <p:txBody>
-          <a:bodyPr/>
-          <a:lstStyle/>
-          <a:p>
-            <a:endParaRPr lang="it-IT" dirty="0"/>
-          </a:p>
-        </p:txBody>
-      </p:sp>
-    </p:spTree>
-    <p:extLst>
-      <p:ext uri="{BB962C8B-B14F-4D97-AF65-F5344CB8AC3E}">
-        <p14:creationId xmlns:p14="http://schemas.microsoft.com/office/powerpoint/2010/main" val="1292597256"/>
       </p:ext>
     </p:extLst>
   </p:cSld>
@@ -4864,6 +5023,147 @@
           <p:cNvPr id="2" name="Title 1">
             <a:extLst>
               <a:ext uri="{FF2B5EF4-FFF2-40B4-BE49-F238E27FC236}">
+                <a16:creationId xmlns:a16="http://schemas.microsoft.com/office/drawing/2014/main" id="{AEC5A80E-581C-1B46-9C70-7C00331B9233}"/>
+              </a:ext>
+            </a:extLst>
+          </p:cNvPr>
+          <p:cNvSpPr>
+            <a:spLocks noGrp="1"/>
+          </p:cNvSpPr>
+          <p:nvPr>
+            <p:ph type="title"/>
+          </p:nvPr>
+        </p:nvSpPr>
+        <p:spPr/>
+        <p:txBody>
+          <a:bodyPr/>
+          <a:lstStyle/>
+          <a:p>
+            <a:r>
+              <a:rPr lang="it-IT"/>
+              <a:t>Conclusioni</a:t>
+            </a:r>
+          </a:p>
+        </p:txBody>
+      </p:sp>
+      <p:sp>
+        <p:nvSpPr>
+          <p:cNvPr id="4" name="Footer Placeholder 3">
+            <a:extLst>
+              <a:ext uri="{FF2B5EF4-FFF2-40B4-BE49-F238E27FC236}">
+                <a16:creationId xmlns:a16="http://schemas.microsoft.com/office/drawing/2014/main" id="{D46AA9DE-DDA7-E54C-A21C-54B9077604CB}"/>
+              </a:ext>
+            </a:extLst>
+          </p:cNvPr>
+          <p:cNvSpPr>
+            <a:spLocks noGrp="1"/>
+          </p:cNvSpPr>
+          <p:nvPr>
+            <p:ph type="ftr" sz="quarter" idx="11"/>
+          </p:nvPr>
+        </p:nvSpPr>
+        <p:spPr/>
+        <p:txBody>
+          <a:bodyPr/>
+          <a:lstStyle/>
+          <a:p>
+            <a:r>
+              <a:rPr lang="en-US"/>
+              <a:t>Laurea SS - MIDST– 2023/2024</a:t>
+            </a:r>
+          </a:p>
+        </p:txBody>
+      </p:sp>
+      <p:sp>
+        <p:nvSpPr>
+          <p:cNvPr id="5" name="Slide Number Placeholder 4">
+            <a:extLst>
+              <a:ext uri="{FF2B5EF4-FFF2-40B4-BE49-F238E27FC236}">
+                <a16:creationId xmlns:a16="http://schemas.microsoft.com/office/drawing/2014/main" id="{18BC653A-704D-8348-9299-88A813BA2A97}"/>
+              </a:ext>
+            </a:extLst>
+          </p:cNvPr>
+          <p:cNvSpPr>
+            <a:spLocks noGrp="1"/>
+          </p:cNvSpPr>
+          <p:nvPr>
+            <p:ph type="sldNum" sz="quarter" idx="12"/>
+          </p:nvPr>
+        </p:nvSpPr>
+        <p:spPr/>
+        <p:txBody>
+          <a:bodyPr/>
+          <a:lstStyle/>
+          <a:p>
+            <a:fld id="{FF73DAB7-F89A-F94F-8C5F-3F656CDF0A97}" type="slidenum">
+              <a:rPr lang="en-US" smtClean="0"/>
+              <a:pPr/>
+              <a:t>15</a:t>
+            </a:fld>
+            <a:endParaRPr lang="en-US"/>
+          </a:p>
+        </p:txBody>
+      </p:sp>
+      <p:sp>
+        <p:nvSpPr>
+          <p:cNvPr id="7" name="Segnaposto contenuto 6">
+            <a:extLst>
+              <a:ext uri="{FF2B5EF4-FFF2-40B4-BE49-F238E27FC236}">
+                <a16:creationId xmlns:a16="http://schemas.microsoft.com/office/drawing/2014/main" id="{513B8653-E432-27B5-7A84-AD903EA7535E}"/>
+              </a:ext>
+            </a:extLst>
+          </p:cNvPr>
+          <p:cNvSpPr>
+            <a:spLocks noGrp="1"/>
+          </p:cNvSpPr>
+          <p:nvPr>
+            <p:ph idx="1"/>
+          </p:nvPr>
+        </p:nvSpPr>
+        <p:spPr/>
+        <p:txBody>
+          <a:bodyPr/>
+          <a:lstStyle/>
+          <a:p>
+            <a:endParaRPr lang="it-IT" dirty="0"/>
+          </a:p>
+        </p:txBody>
+      </p:sp>
+    </p:spTree>
+    <p:extLst>
+      <p:ext uri="{BB962C8B-B14F-4D97-AF65-F5344CB8AC3E}">
+        <p14:creationId xmlns:p14="http://schemas.microsoft.com/office/powerpoint/2010/main" val="1292597256"/>
+      </p:ext>
+    </p:extLst>
+  </p:cSld>
+  <p:clrMapOvr>
+    <a:masterClrMapping/>
+  </p:clrMapOvr>
+</p:sld>
+</file>
+
+<file path=ppt/slides/slide16.xml><?xml version="1.0" encoding="utf-8"?>
+<p:sld xmlns:a="http://schemas.openxmlformats.org/drawingml/2006/main" xmlns:r="http://schemas.openxmlformats.org/officeDocument/2006/relationships" xmlns:p="http://schemas.openxmlformats.org/presentationml/2006/main">
+  <p:cSld>
+    <p:spTree>
+      <p:nvGrpSpPr>
+        <p:cNvPr id="1" name=""/>
+        <p:cNvGrpSpPr/>
+        <p:nvPr/>
+      </p:nvGrpSpPr>
+      <p:grpSpPr>
+        <a:xfrm>
+          <a:off x="0" y="0"/>
+          <a:ext cx="0" cy="0"/>
+          <a:chOff x="0" y="0"/>
+          <a:chExt cx="0" cy="0"/>
+        </a:xfrm>
+      </p:grpSpPr>
+      <p:sp>
+        <p:nvSpPr>
+          <p:cNvPr id="2" name="Title 1">
+            <a:extLst>
+              <a:ext uri="{FF2B5EF4-FFF2-40B4-BE49-F238E27FC236}">
                 <a16:creationId xmlns:a16="http://schemas.microsoft.com/office/drawing/2014/main" id="{1D135DA9-1BAF-354B-BD84-CB98CDF8AF4D}"/>
               </a:ext>
             </a:extLst>
@@ -4939,7 +5239,7 @@
             <a:fld id="{FF73DAB7-F89A-F94F-8C5F-3F656CDF0A97}" type="slidenum">
               <a:rPr lang="en-US" smtClean="0"/>
               <a:pPr/>
-              <a:t>15</a:t>
+              <a:t>16</a:t>
             </a:fld>
             <a:endParaRPr lang="en-US"/>
           </a:p>
@@ -7187,6 +7487,168 @@
         <p:cNvPr id="1" name="">
           <a:extLst>
             <a:ext uri="{FF2B5EF4-FFF2-40B4-BE49-F238E27FC236}">
+              <a16:creationId xmlns:a16="http://schemas.microsoft.com/office/drawing/2014/main" id="{7B86E0E9-9C68-9D57-A2D4-15264F890785}"/>
+            </a:ext>
+          </a:extLst>
+        </p:cNvPr>
+        <p:cNvGrpSpPr/>
+        <p:nvPr/>
+      </p:nvGrpSpPr>
+      <p:grpSpPr>
+        <a:xfrm>
+          <a:off x="0" y="0"/>
+          <a:ext cx="0" cy="0"/>
+          <a:chOff x="0" y="0"/>
+          <a:chExt cx="0" cy="0"/>
+        </a:xfrm>
+      </p:grpSpPr>
+      <p:sp>
+        <p:nvSpPr>
+          <p:cNvPr id="2" name="Title 1">
+            <a:extLst>
+              <a:ext uri="{FF2B5EF4-FFF2-40B4-BE49-F238E27FC236}">
+                <a16:creationId xmlns:a16="http://schemas.microsoft.com/office/drawing/2014/main" id="{7A7EFB96-E515-FFFD-F535-F2C17F5658C0}"/>
+              </a:ext>
+            </a:extLst>
+          </p:cNvPr>
+          <p:cNvSpPr>
+            <a:spLocks noGrp="1"/>
+          </p:cNvSpPr>
+          <p:nvPr>
+            <p:ph type="title"/>
+          </p:nvPr>
+        </p:nvSpPr>
+        <p:spPr/>
+        <p:txBody>
+          <a:bodyPr>
+            <a:normAutofit fontScale="90000"/>
+          </a:bodyPr>
+          <a:lstStyle/>
+          <a:p>
+            <a:r>
+              <a:rPr lang="it-IT" dirty="0"/>
+              <a:t>Creazione collezione sperimentale (3)</a:t>
+            </a:r>
+          </a:p>
+        </p:txBody>
+      </p:sp>
+      <p:sp>
+        <p:nvSpPr>
+          <p:cNvPr id="4" name="Footer Placeholder 3">
+            <a:extLst>
+              <a:ext uri="{FF2B5EF4-FFF2-40B4-BE49-F238E27FC236}">
+                <a16:creationId xmlns:a16="http://schemas.microsoft.com/office/drawing/2014/main" id="{99680EE9-C421-260C-D858-486C36301CC0}"/>
+              </a:ext>
+            </a:extLst>
+          </p:cNvPr>
+          <p:cNvSpPr>
+            <a:spLocks noGrp="1"/>
+          </p:cNvSpPr>
+          <p:nvPr>
+            <p:ph type="ftr" sz="quarter" idx="11"/>
+          </p:nvPr>
+        </p:nvSpPr>
+        <p:spPr/>
+        <p:txBody>
+          <a:bodyPr/>
+          <a:lstStyle/>
+          <a:p>
+            <a:r>
+              <a:rPr lang="en-US"/>
+              <a:t>Laurea SS - MIDST– 2023/2024</a:t>
+            </a:r>
+          </a:p>
+        </p:txBody>
+      </p:sp>
+      <p:sp>
+        <p:nvSpPr>
+          <p:cNvPr id="5" name="Slide Number Placeholder 4">
+            <a:extLst>
+              <a:ext uri="{FF2B5EF4-FFF2-40B4-BE49-F238E27FC236}">
+                <a16:creationId xmlns:a16="http://schemas.microsoft.com/office/drawing/2014/main" id="{9A8F0DCF-CD14-4312-A414-963A70E6BFBB}"/>
+              </a:ext>
+            </a:extLst>
+          </p:cNvPr>
+          <p:cNvSpPr>
+            <a:spLocks noGrp="1"/>
+          </p:cNvSpPr>
+          <p:nvPr>
+            <p:ph type="sldNum" sz="quarter" idx="12"/>
+          </p:nvPr>
+        </p:nvSpPr>
+        <p:spPr/>
+        <p:txBody>
+          <a:bodyPr/>
+          <a:lstStyle/>
+          <a:p>
+            <a:fld id="{FF73DAB7-F89A-F94F-8C5F-3F656CDF0A97}" type="slidenum">
+              <a:rPr lang="en-US" smtClean="0"/>
+              <a:pPr/>
+              <a:t>8</a:t>
+            </a:fld>
+            <a:endParaRPr lang="en-US"/>
+          </a:p>
+        </p:txBody>
+      </p:sp>
+      <p:sp>
+        <p:nvSpPr>
+          <p:cNvPr id="3" name="CasellaDiTesto 2">
+            <a:extLst>
+              <a:ext uri="{FF2B5EF4-FFF2-40B4-BE49-F238E27FC236}">
+                <a16:creationId xmlns:a16="http://schemas.microsoft.com/office/drawing/2014/main" id="{86A78BAF-A4B5-1A88-0024-980ADAE83FAE}"/>
+              </a:ext>
+            </a:extLst>
+          </p:cNvPr>
+          <p:cNvSpPr txBox="1"/>
+          <p:nvPr/>
+        </p:nvSpPr>
+        <p:spPr>
+          <a:xfrm>
+            <a:off x="197963" y="1706252"/>
+            <a:ext cx="8748074" cy="2308324"/>
+          </a:xfrm>
+          <a:prstGeom prst="rect">
+            <a:avLst/>
+          </a:prstGeom>
+          <a:noFill/>
+        </p:spPr>
+        <p:txBody>
+          <a:bodyPr wrap="square" rtlCol="0">
+            <a:spAutoFit/>
+          </a:bodyPr>
+          <a:lstStyle/>
+          <a:p>
+            <a:r>
+              <a:rPr lang="it-IT" sz="2400" dirty="0"/>
+              <a:t>4)Durante la creazione della nuova collezione si crea una struttura dati (ad esempio dizionario) o file in cui per ogni id di un documento originale sono associati gli id dei documenti artificiali (o viceversa), in questo modo la procedura di valutazione è più efficiente.</a:t>
+            </a:r>
+          </a:p>
+          <a:p>
+            <a:endParaRPr lang="it-IT" sz="2400" dirty="0"/>
+          </a:p>
+        </p:txBody>
+      </p:sp>
+    </p:spTree>
+    <p:extLst>
+      <p:ext uri="{BB962C8B-B14F-4D97-AF65-F5344CB8AC3E}">
+        <p14:creationId xmlns:p14="http://schemas.microsoft.com/office/powerpoint/2010/main" val="4122338981"/>
+      </p:ext>
+    </p:extLst>
+  </p:cSld>
+  <p:clrMapOvr>
+    <a:masterClrMapping/>
+  </p:clrMapOvr>
+</p:sld>
+</file>
+
+<file path=ppt/slides/slide9.xml><?xml version="1.0" encoding="utf-8"?>
+<p:sld xmlns:a="http://schemas.openxmlformats.org/drawingml/2006/main" xmlns:r="http://schemas.openxmlformats.org/officeDocument/2006/relationships" xmlns:p="http://schemas.openxmlformats.org/presentationml/2006/main">
+  <p:cSld>
+    <p:spTree>
+      <p:nvGrpSpPr>
+        <p:cNvPr id="1" name="">
+          <a:extLst>
+            <a:ext uri="{FF2B5EF4-FFF2-40B4-BE49-F238E27FC236}">
               <a16:creationId xmlns:a16="http://schemas.microsoft.com/office/drawing/2014/main" id="{C0FBF60D-C6F8-941D-5895-BDC8BE7B09DD}"/>
             </a:ext>
           </a:extLst>
@@ -7286,7 +7748,7 @@
             <a:fld id="{FF73DAB7-F89A-F94F-8C5F-3F656CDF0A97}" type="slidenum">
               <a:rPr lang="en-US" smtClean="0"/>
               <a:pPr/>
-              <a:t>8</a:t>
+              <a:t>9</a:t>
             </a:fld>
             <a:endParaRPr lang="en-US"/>
           </a:p>
@@ -7443,242 +7905,6 @@
     <p:extLst>
       <p:ext uri="{BB962C8B-B14F-4D97-AF65-F5344CB8AC3E}">
         <p14:creationId xmlns:p14="http://schemas.microsoft.com/office/powerpoint/2010/main" val="2596837817"/>
-      </p:ext>
-    </p:extLst>
-  </p:cSld>
-  <p:clrMapOvr>
-    <a:masterClrMapping/>
-  </p:clrMapOvr>
-</p:sld>
-</file>
-
-<file path=ppt/slides/slide9.xml><?xml version="1.0" encoding="utf-8"?>
-<p:sld xmlns:a="http://schemas.openxmlformats.org/drawingml/2006/main" xmlns:r="http://schemas.openxmlformats.org/officeDocument/2006/relationships" xmlns:p="http://schemas.openxmlformats.org/presentationml/2006/main">
-  <p:cSld>
-    <p:spTree>
-      <p:nvGrpSpPr>
-        <p:cNvPr id="1" name=""/>
-        <p:cNvGrpSpPr/>
-        <p:nvPr/>
-      </p:nvGrpSpPr>
-      <p:grpSpPr>
-        <a:xfrm>
-          <a:off x="0" y="0"/>
-          <a:ext cx="0" cy="0"/>
-          <a:chOff x="0" y="0"/>
-          <a:chExt cx="0" cy="0"/>
-        </a:xfrm>
-      </p:grpSpPr>
-      <p:sp>
-        <p:nvSpPr>
-          <p:cNvPr id="2" name="Titolo 1">
-            <a:extLst>
-              <a:ext uri="{FF2B5EF4-FFF2-40B4-BE49-F238E27FC236}">
-                <a16:creationId xmlns:a16="http://schemas.microsoft.com/office/drawing/2014/main" id="{A090C56D-29A0-EF43-6316-9E849584A8AC}"/>
-              </a:ext>
-            </a:extLst>
-          </p:cNvPr>
-          <p:cNvSpPr>
-            <a:spLocks noGrp="1"/>
-          </p:cNvSpPr>
-          <p:nvPr>
-            <p:ph type="title"/>
-          </p:nvPr>
-        </p:nvSpPr>
-        <p:spPr/>
-        <p:txBody>
-          <a:bodyPr/>
-          <a:lstStyle/>
-          <a:p>
-            <a:r>
-              <a:rPr lang="it-IT" dirty="0" err="1"/>
-              <a:t>Shingling</a:t>
-            </a:r>
-            <a:r>
-              <a:rPr lang="it-IT" dirty="0"/>
-              <a:t> (2)</a:t>
-            </a:r>
-          </a:p>
-        </p:txBody>
-      </p:sp>
-      <p:sp>
-        <p:nvSpPr>
-          <p:cNvPr id="4" name="Segnaposto piè di pagina 3">
-            <a:extLst>
-              <a:ext uri="{FF2B5EF4-FFF2-40B4-BE49-F238E27FC236}">
-                <a16:creationId xmlns:a16="http://schemas.microsoft.com/office/drawing/2014/main" id="{62F23097-9057-0F8B-66D9-54B2F9AD4DDD}"/>
-              </a:ext>
-            </a:extLst>
-          </p:cNvPr>
-          <p:cNvSpPr>
-            <a:spLocks noGrp="1"/>
-          </p:cNvSpPr>
-          <p:nvPr>
-            <p:ph type="ftr" sz="quarter" idx="11"/>
-          </p:nvPr>
-        </p:nvSpPr>
-        <p:spPr/>
-        <p:txBody>
-          <a:bodyPr/>
-          <a:lstStyle/>
-          <a:p>
-            <a:r>
-              <a:rPr lang="en-US"/>
-              <a:t>Laurea SS - MIDST– 2023/2024 </a:t>
-            </a:r>
-          </a:p>
-        </p:txBody>
-      </p:sp>
-      <p:sp>
-        <p:nvSpPr>
-          <p:cNvPr id="5" name="Segnaposto numero diapositiva 4">
-            <a:extLst>
-              <a:ext uri="{FF2B5EF4-FFF2-40B4-BE49-F238E27FC236}">
-                <a16:creationId xmlns:a16="http://schemas.microsoft.com/office/drawing/2014/main" id="{0D519249-364B-4034-F964-0FCFD26E23B2}"/>
-              </a:ext>
-            </a:extLst>
-          </p:cNvPr>
-          <p:cNvSpPr>
-            <a:spLocks noGrp="1"/>
-          </p:cNvSpPr>
-          <p:nvPr>
-            <p:ph type="sldNum" sz="quarter" idx="12"/>
-          </p:nvPr>
-        </p:nvSpPr>
-        <p:spPr/>
-        <p:txBody>
-          <a:bodyPr/>
-          <a:lstStyle/>
-          <a:p>
-            <a:fld id="{FF73DAB7-F89A-F94F-8C5F-3F656CDF0A97}" type="slidenum">
-              <a:rPr lang="en-US" smtClean="0"/>
-              <a:pPr/>
-              <a:t>9</a:t>
-            </a:fld>
-            <a:endParaRPr lang="en-US"/>
-          </a:p>
-        </p:txBody>
-      </p:sp>
-      <p:sp>
-        <p:nvSpPr>
-          <p:cNvPr id="8" name="Segnaposto contenuto 6">
-            <a:extLst>
-              <a:ext uri="{FF2B5EF4-FFF2-40B4-BE49-F238E27FC236}">
-                <a16:creationId xmlns:a16="http://schemas.microsoft.com/office/drawing/2014/main" id="{30AACAF1-0A2F-B1D4-B3C2-CAB5424964F6}"/>
-              </a:ext>
-            </a:extLst>
-          </p:cNvPr>
-          <p:cNvSpPr>
-            <a:spLocks noGrp="1"/>
-          </p:cNvSpPr>
-          <p:nvPr>
-            <p:ph idx="1"/>
-          </p:nvPr>
-        </p:nvSpPr>
-        <p:spPr>
-          <a:xfrm>
-            <a:off x="457200" y="1562493"/>
-            <a:ext cx="8517118" cy="5158982"/>
-          </a:xfrm>
-        </p:spPr>
-        <p:txBody>
-          <a:bodyPr>
-            <a:normAutofit/>
-          </a:bodyPr>
-          <a:lstStyle/>
-          <a:p>
-            <a:r>
-              <a:rPr lang="it-IT" sz="2400" dirty="0"/>
-              <a:t>Struttura dati per salvare le </a:t>
-            </a:r>
-            <a:r>
-              <a:rPr lang="it-IT" sz="2400" dirty="0" err="1"/>
-              <a:t>shingles</a:t>
-            </a:r>
-            <a:r>
-              <a:rPr lang="it-IT" sz="2400" dirty="0"/>
-              <a:t> (i loro hash): l’insieme delle </a:t>
-            </a:r>
-            <a:r>
-              <a:rPr lang="it-IT" sz="2400" dirty="0" err="1"/>
-              <a:t>shingles</a:t>
-            </a:r>
-            <a:r>
-              <a:rPr lang="it-IT" sz="2400" dirty="0"/>
-              <a:t> è temporaneo, serve solo per calcolare la signature, poi è eliminato</a:t>
-            </a:r>
-          </a:p>
-          <a:p>
-            <a:pPr lvl="1"/>
-            <a:r>
-              <a:rPr lang="it-IT" sz="2000" dirty="0"/>
-              <a:t>Lista ordinata:</a:t>
-            </a:r>
-          </a:p>
-          <a:p>
-            <a:pPr lvl="2"/>
-            <a:r>
-              <a:rPr lang="it-IT" sz="1600" dirty="0"/>
-              <a:t>Pro: occupa poca memoria O(n)</a:t>
-            </a:r>
-          </a:p>
-          <a:p>
-            <a:pPr lvl="2"/>
-            <a:r>
-              <a:rPr lang="it-IT" sz="1600" dirty="0"/>
-              <a:t>Contro: per ordinarla la complessità è O(n * log(n))</a:t>
-            </a:r>
-          </a:p>
-          <a:p>
-            <a:pPr lvl="2"/>
-            <a:r>
-              <a:rPr lang="it-IT" sz="1600" dirty="0"/>
-              <a:t>Neutrale: ricerca di un elemento in  O(log(n)) (</a:t>
-            </a:r>
-            <a:r>
-              <a:rPr lang="it-IT" sz="1600" dirty="0" err="1"/>
-              <a:t>binary</a:t>
-            </a:r>
-            <a:r>
-              <a:rPr lang="it-IT" sz="1600" dirty="0"/>
-              <a:t> </a:t>
-            </a:r>
-            <a:r>
-              <a:rPr lang="it-IT" sz="1600" dirty="0" err="1"/>
-              <a:t>search</a:t>
-            </a:r>
-            <a:r>
-              <a:rPr lang="it-IT" sz="1600" dirty="0"/>
-              <a:t>)</a:t>
-            </a:r>
-          </a:p>
-          <a:p>
-            <a:pPr lvl="1"/>
-            <a:r>
-              <a:rPr lang="it-IT" sz="2000" dirty="0"/>
-              <a:t>Hash list</a:t>
-            </a:r>
-          </a:p>
-          <a:p>
-            <a:pPr lvl="2"/>
-            <a:r>
-              <a:rPr lang="it-IT" sz="1600" dirty="0"/>
-              <a:t>Pro: ricerca in O(1)</a:t>
-            </a:r>
-          </a:p>
-          <a:p>
-            <a:pPr lvl="2"/>
-            <a:r>
-              <a:rPr lang="it-IT" sz="1600" dirty="0"/>
-              <a:t>Contro: (se in media vogliamo la ricerca in O(1)) deve occupare molta memoria (celle vuote in circa il 70 % delle posizioni)</a:t>
-            </a:r>
-          </a:p>
-        </p:txBody>
-      </p:sp>
-    </p:spTree>
-    <p:extLst>
-      <p:ext uri="{BB962C8B-B14F-4D97-AF65-F5344CB8AC3E}">
-        <p14:creationId xmlns:p14="http://schemas.microsoft.com/office/powerpoint/2010/main" val="2043850614"/>
       </p:ext>
     </p:extLst>
   </p:cSld>

</xml_diff>

<commit_message>
added naive LSH implmentation and gitignores file untracking pycaches directories
</commit_message>
<xml_diff>
--- a/slides/ita/slides_ita.pptx
+++ b/slides/ita/slides_ita.pptx
@@ -6,7 +6,7 @@
     <p:sldMasterId id="2147483665" r:id="rId2"/>
   </p:sldMasterIdLst>
   <p:notesMasterIdLst>
-    <p:notesMasterId r:id="rId19"/>
+    <p:notesMasterId r:id="rId20"/>
   </p:notesMasterIdLst>
   <p:sldIdLst>
     <p:sldId id="256" r:id="rId3"/>
@@ -22,9 +22,10 @@
     <p:sldId id="277" r:id="rId13"/>
     <p:sldId id="280" r:id="rId14"/>
     <p:sldId id="278" r:id="rId15"/>
-    <p:sldId id="276" r:id="rId16"/>
-    <p:sldId id="270" r:id="rId17"/>
-    <p:sldId id="271" r:id="rId18"/>
+    <p:sldId id="282" r:id="rId16"/>
+    <p:sldId id="276" r:id="rId17"/>
+    <p:sldId id="270" r:id="rId18"/>
+    <p:sldId id="271" r:id="rId19"/>
   </p:sldIdLst>
   <p:sldSz cx="9144000" cy="6858000" type="screen4x3"/>
   <p:notesSz cx="6858000" cy="9144000"/>
@@ -4603,6 +4604,44 @@
               <a:t>) e le signatures devono essere delle liste ordinate.</a:t>
             </a:r>
           </a:p>
+          <a:p>
+            <a:r>
+              <a:rPr lang="it-IT" sz="2400" dirty="0"/>
+              <a:t>In una possibile implementazione (</a:t>
+            </a:r>
+            <a:r>
+              <a:rPr lang="it-IT" sz="2400" dirty="0" err="1"/>
+              <a:t>memory</a:t>
+            </a:r>
+            <a:r>
+              <a:rPr lang="it-IT" sz="2400" dirty="0"/>
+              <a:t> </a:t>
+            </a:r>
+            <a:r>
+              <a:rPr lang="it-IT" sz="2400" dirty="0" err="1"/>
+              <a:t>wise</a:t>
+            </a:r>
+            <a:r>
+              <a:rPr lang="it-IT" sz="2400" dirty="0"/>
+              <a:t>) non vengono mantenute in memoria le signatures: ciascuna signature è impiegata per eseguire </a:t>
+            </a:r>
+            <a:r>
+              <a:rPr lang="it-IT" sz="2400" dirty="0" err="1"/>
+              <a:t>LSH</a:t>
+            </a:r>
+            <a:r>
+              <a:rPr lang="it-IT" sz="2400" dirty="0"/>
+              <a:t> e poi è rimossa dalla memoria (in questo caso ci si aspetta una riduzione delle precisione poiché l’unico criterio di similarità è basato sui bucket </a:t>
+            </a:r>
+            <a:r>
+              <a:rPr lang="it-IT" sz="2400" dirty="0" err="1"/>
+              <a:t>LSH</a:t>
+            </a:r>
+            <a:r>
+              <a:rPr lang="it-IT" sz="2400" dirty="0"/>
+              <a:t>)</a:t>
+            </a:r>
+          </a:p>
         </p:txBody>
       </p:sp>
     </p:spTree>
@@ -4828,6 +4867,12 @@
               <a:t>In memoria di massa</a:t>
             </a:r>
           </a:p>
+          <a:p>
+            <a:pPr marL="363537" lvl="1" indent="0">
+              <a:buNone/>
+            </a:pPr>
+            <a:endParaRPr lang="it-IT" sz="2000" dirty="0"/>
+          </a:p>
         </p:txBody>
       </p:sp>
     </p:spTree>
@@ -4844,6 +4889,159 @@
 </file>
 
 <file path=ppt/slides/slide14.xml><?xml version="1.0" encoding="utf-8"?>
+<p:sld xmlns:a="http://schemas.openxmlformats.org/drawingml/2006/main" xmlns:r="http://schemas.openxmlformats.org/officeDocument/2006/relationships" xmlns:p="http://schemas.openxmlformats.org/presentationml/2006/main">
+  <p:cSld>
+    <p:spTree>
+      <p:nvGrpSpPr>
+        <p:cNvPr id="1" name="">
+          <a:extLst>
+            <a:ext uri="{FF2B5EF4-FFF2-40B4-BE49-F238E27FC236}">
+              <a16:creationId xmlns:a16="http://schemas.microsoft.com/office/drawing/2014/main" id="{8129A9D3-A8A7-DABE-944C-8B9B49F3AF40}"/>
+            </a:ext>
+          </a:extLst>
+        </p:cNvPr>
+        <p:cNvGrpSpPr/>
+        <p:nvPr/>
+      </p:nvGrpSpPr>
+      <p:grpSpPr>
+        <a:xfrm>
+          <a:off x="0" y="0"/>
+          <a:ext cx="0" cy="0"/>
+          <a:chOff x="0" y="0"/>
+          <a:chExt cx="0" cy="0"/>
+        </a:xfrm>
+      </p:grpSpPr>
+      <p:sp>
+        <p:nvSpPr>
+          <p:cNvPr id="2" name="Title 1">
+            <a:extLst>
+              <a:ext uri="{FF2B5EF4-FFF2-40B4-BE49-F238E27FC236}">
+                <a16:creationId xmlns:a16="http://schemas.microsoft.com/office/drawing/2014/main" id="{4385EE50-A8F1-9C1B-6694-4484E230C125}"/>
+              </a:ext>
+            </a:extLst>
+          </p:cNvPr>
+          <p:cNvSpPr>
+            <a:spLocks noGrp="1"/>
+          </p:cNvSpPr>
+          <p:nvPr>
+            <p:ph type="title"/>
+          </p:nvPr>
+        </p:nvSpPr>
+        <p:spPr/>
+        <p:txBody>
+          <a:bodyPr/>
+          <a:lstStyle/>
+          <a:p>
+            <a:r>
+              <a:rPr lang="it-IT" dirty="0" err="1"/>
+              <a:t>LSH</a:t>
+            </a:r>
+            <a:endParaRPr lang="it-IT" dirty="0"/>
+          </a:p>
+        </p:txBody>
+      </p:sp>
+      <p:sp>
+        <p:nvSpPr>
+          <p:cNvPr id="4" name="Footer Placeholder 3">
+            <a:extLst>
+              <a:ext uri="{FF2B5EF4-FFF2-40B4-BE49-F238E27FC236}">
+                <a16:creationId xmlns:a16="http://schemas.microsoft.com/office/drawing/2014/main" id="{67C3D058-A702-34F6-F647-E12EB05E3959}"/>
+              </a:ext>
+            </a:extLst>
+          </p:cNvPr>
+          <p:cNvSpPr>
+            <a:spLocks noGrp="1"/>
+          </p:cNvSpPr>
+          <p:nvPr>
+            <p:ph type="ftr" sz="quarter" idx="11"/>
+          </p:nvPr>
+        </p:nvSpPr>
+        <p:spPr/>
+        <p:txBody>
+          <a:bodyPr/>
+          <a:lstStyle/>
+          <a:p>
+            <a:r>
+              <a:rPr lang="en-US"/>
+              <a:t>Laurea SS - MIDST– 2023/2024</a:t>
+            </a:r>
+          </a:p>
+        </p:txBody>
+      </p:sp>
+      <p:sp>
+        <p:nvSpPr>
+          <p:cNvPr id="5" name="Slide Number Placeholder 4">
+            <a:extLst>
+              <a:ext uri="{FF2B5EF4-FFF2-40B4-BE49-F238E27FC236}">
+                <a16:creationId xmlns:a16="http://schemas.microsoft.com/office/drawing/2014/main" id="{CF5336AB-52F8-AE82-8992-99A4A266B5FE}"/>
+              </a:ext>
+            </a:extLst>
+          </p:cNvPr>
+          <p:cNvSpPr>
+            <a:spLocks noGrp="1"/>
+          </p:cNvSpPr>
+          <p:nvPr>
+            <p:ph type="sldNum" sz="quarter" idx="12"/>
+          </p:nvPr>
+        </p:nvSpPr>
+        <p:spPr/>
+        <p:txBody>
+          <a:bodyPr/>
+          <a:lstStyle/>
+          <a:p>
+            <a:fld id="{FF73DAB7-F89A-F94F-8C5F-3F656CDF0A97}" type="slidenum">
+              <a:rPr lang="en-US" smtClean="0"/>
+              <a:pPr/>
+              <a:t>14</a:t>
+            </a:fld>
+            <a:endParaRPr lang="en-US"/>
+          </a:p>
+        </p:txBody>
+      </p:sp>
+      <p:sp>
+        <p:nvSpPr>
+          <p:cNvPr id="7" name="Segnaposto contenuto 6">
+            <a:extLst>
+              <a:ext uri="{FF2B5EF4-FFF2-40B4-BE49-F238E27FC236}">
+                <a16:creationId xmlns:a16="http://schemas.microsoft.com/office/drawing/2014/main" id="{AEBB85F2-CE39-A19A-A076-24752C110A83}"/>
+              </a:ext>
+            </a:extLst>
+          </p:cNvPr>
+          <p:cNvSpPr>
+            <a:spLocks noGrp="1"/>
+          </p:cNvSpPr>
+          <p:nvPr>
+            <p:ph idx="1"/>
+          </p:nvPr>
+        </p:nvSpPr>
+        <p:spPr/>
+        <p:txBody>
+          <a:bodyPr>
+            <a:normAutofit/>
+          </a:bodyPr>
+          <a:lstStyle/>
+          <a:p>
+            <a:r>
+              <a:rPr lang="it-IT" sz="2400" dirty="0"/>
+              <a:t>Elaborando documento per documento di devono mantenere in memoria gli insiemi di bucket per tutte le bande: ciò può essere problematico. L’alternativa è elaborare banda per banda (mantenendo quindi un solo insieme di bucket in memoria alla volta), ma ciò significa mantenere in memoria tutte le signature e dover passare b (numero di bande) volte sugli n documenti, azione che appare eccessivamente dispendiosa.</a:t>
+            </a:r>
+          </a:p>
+        </p:txBody>
+      </p:sp>
+    </p:spTree>
+    <p:extLst>
+      <p:ext uri="{BB962C8B-B14F-4D97-AF65-F5344CB8AC3E}">
+        <p14:creationId xmlns:p14="http://schemas.microsoft.com/office/powerpoint/2010/main" val="3427979540"/>
+      </p:ext>
+    </p:extLst>
+  </p:cSld>
+  <p:clrMapOvr>
+    <a:masterClrMapping/>
+  </p:clrMapOvr>
+</p:sld>
+</file>
+
+<file path=ppt/slides/slide15.xml><?xml version="1.0" encoding="utf-8"?>
 <p:sld xmlns:a="http://schemas.openxmlformats.org/drawingml/2006/main" xmlns:r="http://schemas.openxmlformats.org/officeDocument/2006/relationships" xmlns:p="http://schemas.openxmlformats.org/presentationml/2006/main">
   <p:cSld>
     <p:spTree>
@@ -4946,7 +5144,7 @@
             <a:fld id="{FF73DAB7-F89A-F94F-8C5F-3F656CDF0A97}" type="slidenum">
               <a:rPr lang="en-US" smtClean="0"/>
               <a:pPr/>
-              <a:t>14</a:t>
+              <a:t>15</a:t>
             </a:fld>
             <a:endParaRPr lang="en-US"/>
           </a:p>
@@ -4992,147 +5190,6 @@
     <p:extLst>
       <p:ext uri="{BB962C8B-B14F-4D97-AF65-F5344CB8AC3E}">
         <p14:creationId xmlns:p14="http://schemas.microsoft.com/office/powerpoint/2010/main" val="2304361174"/>
-      </p:ext>
-    </p:extLst>
-  </p:cSld>
-  <p:clrMapOvr>
-    <a:masterClrMapping/>
-  </p:clrMapOvr>
-</p:sld>
-</file>
-
-<file path=ppt/slides/slide15.xml><?xml version="1.0" encoding="utf-8"?>
-<p:sld xmlns:a="http://schemas.openxmlformats.org/drawingml/2006/main" xmlns:r="http://schemas.openxmlformats.org/officeDocument/2006/relationships" xmlns:p="http://schemas.openxmlformats.org/presentationml/2006/main">
-  <p:cSld>
-    <p:spTree>
-      <p:nvGrpSpPr>
-        <p:cNvPr id="1" name=""/>
-        <p:cNvGrpSpPr/>
-        <p:nvPr/>
-      </p:nvGrpSpPr>
-      <p:grpSpPr>
-        <a:xfrm>
-          <a:off x="0" y="0"/>
-          <a:ext cx="0" cy="0"/>
-          <a:chOff x="0" y="0"/>
-          <a:chExt cx="0" cy="0"/>
-        </a:xfrm>
-      </p:grpSpPr>
-      <p:sp>
-        <p:nvSpPr>
-          <p:cNvPr id="2" name="Title 1">
-            <a:extLst>
-              <a:ext uri="{FF2B5EF4-FFF2-40B4-BE49-F238E27FC236}">
-                <a16:creationId xmlns:a16="http://schemas.microsoft.com/office/drawing/2014/main" id="{AEC5A80E-581C-1B46-9C70-7C00331B9233}"/>
-              </a:ext>
-            </a:extLst>
-          </p:cNvPr>
-          <p:cNvSpPr>
-            <a:spLocks noGrp="1"/>
-          </p:cNvSpPr>
-          <p:nvPr>
-            <p:ph type="title"/>
-          </p:nvPr>
-        </p:nvSpPr>
-        <p:spPr/>
-        <p:txBody>
-          <a:bodyPr/>
-          <a:lstStyle/>
-          <a:p>
-            <a:r>
-              <a:rPr lang="it-IT"/>
-              <a:t>Conclusioni</a:t>
-            </a:r>
-          </a:p>
-        </p:txBody>
-      </p:sp>
-      <p:sp>
-        <p:nvSpPr>
-          <p:cNvPr id="4" name="Footer Placeholder 3">
-            <a:extLst>
-              <a:ext uri="{FF2B5EF4-FFF2-40B4-BE49-F238E27FC236}">
-                <a16:creationId xmlns:a16="http://schemas.microsoft.com/office/drawing/2014/main" id="{D46AA9DE-DDA7-E54C-A21C-54B9077604CB}"/>
-              </a:ext>
-            </a:extLst>
-          </p:cNvPr>
-          <p:cNvSpPr>
-            <a:spLocks noGrp="1"/>
-          </p:cNvSpPr>
-          <p:nvPr>
-            <p:ph type="ftr" sz="quarter" idx="11"/>
-          </p:nvPr>
-        </p:nvSpPr>
-        <p:spPr/>
-        <p:txBody>
-          <a:bodyPr/>
-          <a:lstStyle/>
-          <a:p>
-            <a:r>
-              <a:rPr lang="en-US"/>
-              <a:t>Laurea SS - MIDST– 2023/2024</a:t>
-            </a:r>
-          </a:p>
-        </p:txBody>
-      </p:sp>
-      <p:sp>
-        <p:nvSpPr>
-          <p:cNvPr id="5" name="Slide Number Placeholder 4">
-            <a:extLst>
-              <a:ext uri="{FF2B5EF4-FFF2-40B4-BE49-F238E27FC236}">
-                <a16:creationId xmlns:a16="http://schemas.microsoft.com/office/drawing/2014/main" id="{18BC653A-704D-8348-9299-88A813BA2A97}"/>
-              </a:ext>
-            </a:extLst>
-          </p:cNvPr>
-          <p:cNvSpPr>
-            <a:spLocks noGrp="1"/>
-          </p:cNvSpPr>
-          <p:nvPr>
-            <p:ph type="sldNum" sz="quarter" idx="12"/>
-          </p:nvPr>
-        </p:nvSpPr>
-        <p:spPr/>
-        <p:txBody>
-          <a:bodyPr/>
-          <a:lstStyle/>
-          <a:p>
-            <a:fld id="{FF73DAB7-F89A-F94F-8C5F-3F656CDF0A97}" type="slidenum">
-              <a:rPr lang="en-US" smtClean="0"/>
-              <a:pPr/>
-              <a:t>15</a:t>
-            </a:fld>
-            <a:endParaRPr lang="en-US"/>
-          </a:p>
-        </p:txBody>
-      </p:sp>
-      <p:sp>
-        <p:nvSpPr>
-          <p:cNvPr id="7" name="Segnaposto contenuto 6">
-            <a:extLst>
-              <a:ext uri="{FF2B5EF4-FFF2-40B4-BE49-F238E27FC236}">
-                <a16:creationId xmlns:a16="http://schemas.microsoft.com/office/drawing/2014/main" id="{513B8653-E432-27B5-7A84-AD903EA7535E}"/>
-              </a:ext>
-            </a:extLst>
-          </p:cNvPr>
-          <p:cNvSpPr>
-            <a:spLocks noGrp="1"/>
-          </p:cNvSpPr>
-          <p:nvPr>
-            <p:ph idx="1"/>
-          </p:nvPr>
-        </p:nvSpPr>
-        <p:spPr/>
-        <p:txBody>
-          <a:bodyPr/>
-          <a:lstStyle/>
-          <a:p>
-            <a:endParaRPr lang="it-IT" dirty="0"/>
-          </a:p>
-        </p:txBody>
-      </p:sp>
-    </p:spTree>
-    <p:extLst>
-      <p:ext uri="{BB962C8B-B14F-4D97-AF65-F5344CB8AC3E}">
-        <p14:creationId xmlns:p14="http://schemas.microsoft.com/office/powerpoint/2010/main" val="1292597256"/>
       </p:ext>
     </p:extLst>
   </p:cSld>
@@ -5164,6 +5221,147 @@
           <p:cNvPr id="2" name="Title 1">
             <a:extLst>
               <a:ext uri="{FF2B5EF4-FFF2-40B4-BE49-F238E27FC236}">
+                <a16:creationId xmlns:a16="http://schemas.microsoft.com/office/drawing/2014/main" id="{AEC5A80E-581C-1B46-9C70-7C00331B9233}"/>
+              </a:ext>
+            </a:extLst>
+          </p:cNvPr>
+          <p:cNvSpPr>
+            <a:spLocks noGrp="1"/>
+          </p:cNvSpPr>
+          <p:nvPr>
+            <p:ph type="title"/>
+          </p:nvPr>
+        </p:nvSpPr>
+        <p:spPr/>
+        <p:txBody>
+          <a:bodyPr/>
+          <a:lstStyle/>
+          <a:p>
+            <a:r>
+              <a:rPr lang="it-IT"/>
+              <a:t>Conclusioni</a:t>
+            </a:r>
+          </a:p>
+        </p:txBody>
+      </p:sp>
+      <p:sp>
+        <p:nvSpPr>
+          <p:cNvPr id="4" name="Footer Placeholder 3">
+            <a:extLst>
+              <a:ext uri="{FF2B5EF4-FFF2-40B4-BE49-F238E27FC236}">
+                <a16:creationId xmlns:a16="http://schemas.microsoft.com/office/drawing/2014/main" id="{D46AA9DE-DDA7-E54C-A21C-54B9077604CB}"/>
+              </a:ext>
+            </a:extLst>
+          </p:cNvPr>
+          <p:cNvSpPr>
+            <a:spLocks noGrp="1"/>
+          </p:cNvSpPr>
+          <p:nvPr>
+            <p:ph type="ftr" sz="quarter" idx="11"/>
+          </p:nvPr>
+        </p:nvSpPr>
+        <p:spPr/>
+        <p:txBody>
+          <a:bodyPr/>
+          <a:lstStyle/>
+          <a:p>
+            <a:r>
+              <a:rPr lang="en-US"/>
+              <a:t>Laurea SS - MIDST– 2023/2024</a:t>
+            </a:r>
+          </a:p>
+        </p:txBody>
+      </p:sp>
+      <p:sp>
+        <p:nvSpPr>
+          <p:cNvPr id="5" name="Slide Number Placeholder 4">
+            <a:extLst>
+              <a:ext uri="{FF2B5EF4-FFF2-40B4-BE49-F238E27FC236}">
+                <a16:creationId xmlns:a16="http://schemas.microsoft.com/office/drawing/2014/main" id="{18BC653A-704D-8348-9299-88A813BA2A97}"/>
+              </a:ext>
+            </a:extLst>
+          </p:cNvPr>
+          <p:cNvSpPr>
+            <a:spLocks noGrp="1"/>
+          </p:cNvSpPr>
+          <p:nvPr>
+            <p:ph type="sldNum" sz="quarter" idx="12"/>
+          </p:nvPr>
+        </p:nvSpPr>
+        <p:spPr/>
+        <p:txBody>
+          <a:bodyPr/>
+          <a:lstStyle/>
+          <a:p>
+            <a:fld id="{FF73DAB7-F89A-F94F-8C5F-3F656CDF0A97}" type="slidenum">
+              <a:rPr lang="en-US" smtClean="0"/>
+              <a:pPr/>
+              <a:t>16</a:t>
+            </a:fld>
+            <a:endParaRPr lang="en-US"/>
+          </a:p>
+        </p:txBody>
+      </p:sp>
+      <p:sp>
+        <p:nvSpPr>
+          <p:cNvPr id="7" name="Segnaposto contenuto 6">
+            <a:extLst>
+              <a:ext uri="{FF2B5EF4-FFF2-40B4-BE49-F238E27FC236}">
+                <a16:creationId xmlns:a16="http://schemas.microsoft.com/office/drawing/2014/main" id="{513B8653-E432-27B5-7A84-AD903EA7535E}"/>
+              </a:ext>
+            </a:extLst>
+          </p:cNvPr>
+          <p:cNvSpPr>
+            <a:spLocks noGrp="1"/>
+          </p:cNvSpPr>
+          <p:nvPr>
+            <p:ph idx="1"/>
+          </p:nvPr>
+        </p:nvSpPr>
+        <p:spPr/>
+        <p:txBody>
+          <a:bodyPr/>
+          <a:lstStyle/>
+          <a:p>
+            <a:endParaRPr lang="it-IT" dirty="0"/>
+          </a:p>
+        </p:txBody>
+      </p:sp>
+    </p:spTree>
+    <p:extLst>
+      <p:ext uri="{BB962C8B-B14F-4D97-AF65-F5344CB8AC3E}">
+        <p14:creationId xmlns:p14="http://schemas.microsoft.com/office/powerpoint/2010/main" val="1292597256"/>
+      </p:ext>
+    </p:extLst>
+  </p:cSld>
+  <p:clrMapOvr>
+    <a:masterClrMapping/>
+  </p:clrMapOvr>
+</p:sld>
+</file>
+
+<file path=ppt/slides/slide17.xml><?xml version="1.0" encoding="utf-8"?>
+<p:sld xmlns:a="http://schemas.openxmlformats.org/drawingml/2006/main" xmlns:r="http://schemas.openxmlformats.org/officeDocument/2006/relationships" xmlns:p="http://schemas.openxmlformats.org/presentationml/2006/main">
+  <p:cSld>
+    <p:spTree>
+      <p:nvGrpSpPr>
+        <p:cNvPr id="1" name=""/>
+        <p:cNvGrpSpPr/>
+        <p:nvPr/>
+      </p:nvGrpSpPr>
+      <p:grpSpPr>
+        <a:xfrm>
+          <a:off x="0" y="0"/>
+          <a:ext cx="0" cy="0"/>
+          <a:chOff x="0" y="0"/>
+          <a:chExt cx="0" cy="0"/>
+        </a:xfrm>
+      </p:grpSpPr>
+      <p:sp>
+        <p:nvSpPr>
+          <p:cNvPr id="2" name="Title 1">
+            <a:extLst>
+              <a:ext uri="{FF2B5EF4-FFF2-40B4-BE49-F238E27FC236}">
                 <a16:creationId xmlns:a16="http://schemas.microsoft.com/office/drawing/2014/main" id="{1D135DA9-1BAF-354B-BD84-CB98CDF8AF4D}"/>
               </a:ext>
             </a:extLst>
@@ -5239,7 +5437,7 @@
             <a:fld id="{FF73DAB7-F89A-F94F-8C5F-3F656CDF0A97}" type="slidenum">
               <a:rPr lang="en-US" smtClean="0"/>
               <a:pPr/>
-              <a:t>16</a:t>
+              <a:t>17</a:t>
             </a:fld>
             <a:endParaRPr lang="en-US"/>
           </a:p>

</xml_diff>

<commit_message>
updated README.md with some folders descriptions, changed the functions to make the shingles, so all return a numpy array
</commit_message>
<xml_diff>
--- a/slides/ita/slides_ita.pptx
+++ b/slides/ita/slides_ita.pptx
@@ -6,7 +6,7 @@
     <p:sldMasterId id="2147483665" r:id="rId2"/>
   </p:sldMasterIdLst>
   <p:notesMasterIdLst>
-    <p:notesMasterId r:id="rId20"/>
+    <p:notesMasterId r:id="rId21"/>
   </p:notesMasterIdLst>
   <p:sldIdLst>
     <p:sldId id="256" r:id="rId3"/>
@@ -26,6 +26,7 @@
     <p:sldId id="276" r:id="rId17"/>
     <p:sldId id="270" r:id="rId18"/>
     <p:sldId id="271" r:id="rId19"/>
+    <p:sldId id="283" r:id="rId20"/>
   </p:sldIdLst>
   <p:sldSz cx="9144000" cy="6858000" type="screen4x3"/>
   <p:notesSz cx="6858000" cy="9144000"/>
@@ -1263,7 +1264,7 @@
             <a:fld id="{46E5C021-FA02-7D4A-9AAB-ABFA99521826}" type="datetimeFigureOut">
               <a:rPr lang="it-IT" smtClean="0"/>
               <a:pPr/>
-              <a:t>21/02/2024</a:t>
+              <a:t>24/02/2024</a:t>
             </a:fld>
             <a:endParaRPr lang="en-US"/>
           </a:p>
@@ -1473,7 +1474,7 @@
             <a:fld id="{46E5C021-FA02-7D4A-9AAB-ABFA99521826}" type="datetimeFigureOut">
               <a:rPr lang="it-IT" smtClean="0"/>
               <a:pPr/>
-              <a:t>21/02/2024</a:t>
+              <a:t>24/02/2024</a:t>
             </a:fld>
             <a:endParaRPr lang="en-US"/>
           </a:p>
@@ -2164,7 +2165,7 @@
             <a:fld id="{46E5C021-FA02-7D4A-9AAB-ABFA99521826}" type="datetimeFigureOut">
               <a:rPr lang="it-IT" smtClean="0"/>
               <a:pPr/>
-              <a:t>21/02/2024</a:t>
+              <a:t>24/02/2024</a:t>
             </a:fld>
             <a:endParaRPr lang="en-US"/>
           </a:p>
@@ -2379,7 +2380,7 @@
             <a:fld id="{46E5C021-FA02-7D4A-9AAB-ABFA99521826}" type="datetimeFigureOut">
               <a:rPr lang="it-IT" smtClean="0"/>
               <a:pPr/>
-              <a:t>21/02/2024</a:t>
+              <a:t>24/02/2024</a:t>
             </a:fld>
             <a:endParaRPr lang="en-US"/>
           </a:p>
@@ -2687,7 +2688,7 @@
             <a:fld id="{46E5C021-FA02-7D4A-9AAB-ABFA99521826}" type="datetimeFigureOut">
               <a:rPr lang="it-IT" smtClean="0"/>
               <a:pPr/>
-              <a:t>21/02/2024</a:t>
+              <a:t>24/02/2024</a:t>
             </a:fld>
             <a:endParaRPr lang="en-US"/>
           </a:p>
@@ -3298,7 +3299,7 @@
             <a:fld id="{46E5C021-FA02-7D4A-9AAB-ABFA99521826}" type="datetimeFigureOut">
               <a:rPr lang="it-IT" smtClean="0"/>
               <a:pPr/>
-              <a:t>21/02/2024</a:t>
+              <a:t>24/02/2024</a:t>
             </a:fld>
             <a:endParaRPr lang="en-US"/>
           </a:p>
@@ -4164,65 +4165,74 @@
             <a:pPr lvl="1"/>
             <a:r>
               <a:rPr lang="it-IT" sz="2000" dirty="0"/>
-              <a:t>Lista ordinata:</a:t>
+              <a:t>Lista: </a:t>
             </a:r>
           </a:p>
           <a:p>
             <a:pPr lvl="2"/>
             <a:r>
               <a:rPr lang="it-IT" sz="1600" dirty="0"/>
-              <a:t>Pro: occupa poca memoria O(n)</a:t>
+              <a:t>Contro: occupa più memoria del necessario per </a:t>
+            </a:r>
+            <a:r>
+              <a:rPr lang="it-IT" sz="1600" dirty="0" err="1"/>
+              <a:t>shingle</a:t>
+            </a:r>
+            <a:r>
+              <a:rPr lang="it-IT" sz="1600" dirty="0"/>
+              <a:t> ripetute</a:t>
             </a:r>
           </a:p>
           <a:p>
             <a:pPr lvl="2"/>
             <a:r>
               <a:rPr lang="it-IT" sz="1600" dirty="0"/>
-              <a:t>Contro: per ordinarla la complessità è O(n * log(n))</a:t>
+              <a:t>Contro: le </a:t>
+            </a:r>
+            <a:r>
+              <a:rPr lang="it-IT" sz="1600" dirty="0" err="1"/>
+              <a:t>shingle</a:t>
+            </a:r>
+            <a:r>
+              <a:rPr lang="it-IT" sz="1600" dirty="0"/>
+              <a:t> ripetute causano delle inutili operazioni in più nel calcolo delle signatures ()</a:t>
+            </a:r>
+          </a:p>
+          <a:p>
+            <a:pPr lvl="1"/>
+            <a:r>
+              <a:rPr lang="it-IT" sz="2000" dirty="0"/>
+              <a:t>Hash set</a:t>
             </a:r>
           </a:p>
           <a:p>
             <a:pPr lvl="2"/>
             <a:r>
               <a:rPr lang="it-IT" sz="1600" dirty="0"/>
-              <a:t>Neutrale: ricerca di un elemento in  O(log(n)) (</a:t>
+              <a:t>Pro: </a:t>
             </a:r>
             <a:r>
               <a:rPr lang="it-IT" sz="1600" dirty="0" err="1"/>
-              <a:t>binary</a:t>
+              <a:t>shingle</a:t>
             </a:r>
             <a:r>
               <a:rPr lang="it-IT" sz="1600" dirty="0"/>
-              <a:t> </a:t>
+              <a:t> ripetute sono considerate una sola volta</a:t>
+            </a:r>
+          </a:p>
+          <a:p>
+            <a:pPr lvl="2"/>
+            <a:r>
+              <a:rPr lang="it-IT" sz="1600" dirty="0"/>
+              <a:t>Contro: affinché non vi siano eccessive collisioni tra le chiavi una parte di memoria </a:t>
             </a:r>
             <a:r>
               <a:rPr lang="it-IT" sz="1600" dirty="0" err="1"/>
-              <a:t>search</a:t>
+              <a:t>dell</a:t>
             </a:r>
             <a:r>
               <a:rPr lang="it-IT" sz="1600" dirty="0"/>
-              <a:t>)</a:t>
-            </a:r>
-          </a:p>
-          <a:p>
-            <a:pPr lvl="1"/>
-            <a:r>
-              <a:rPr lang="it-IT" sz="2000" dirty="0"/>
-              <a:t>Hash list</a:t>
-            </a:r>
-          </a:p>
-          <a:p>
-            <a:pPr lvl="2"/>
-            <a:r>
-              <a:rPr lang="it-IT" sz="1600" dirty="0"/>
-              <a:t>Pro: ricerca in O(1)</a:t>
-            </a:r>
-          </a:p>
-          <a:p>
-            <a:pPr lvl="2"/>
-            <a:r>
-              <a:rPr lang="it-IT" sz="1600" dirty="0"/>
-              <a:t>Contro: (se in media vogliamo la ricerca in O(1)) deve occupare molta memoria (celle vuote in circa il 70 % delle posizioni)</a:t>
+              <a:t> hash set deve essere vuota, tuttavia, ad eccezione di testi di dimensioni fuori scala ciò non dovrebbe essere un problema</a:t>
             </a:r>
           </a:p>
         </p:txBody>
@@ -4406,7 +4416,15 @@
           <a:p>
             <a:r>
               <a:rPr lang="it-IT" sz="2400" dirty="0"/>
-              <a:t>Scelta del numero k di permutazioni e relative funzioni hash</a:t>
+              <a:t>Scelta del numero k di permutazioni e relative funzioni hash. [6] Universal </a:t>
+            </a:r>
+            <a:r>
+              <a:rPr lang="it-IT" sz="2400" dirty="0" err="1"/>
+              <a:t>hashing</a:t>
+            </a:r>
+            <a:r>
+              <a:rPr lang="it-IT" sz="2400" dirty="0"/>
+              <a:t>.</a:t>
             </a:r>
           </a:p>
           <a:p>
@@ -4420,15 +4438,7 @@
             </a:r>
             <a:r>
               <a:rPr lang="it-IT" sz="2400" dirty="0"/>
-              <a:t>: valutare se tenere in memoria un dizionario con valori di vettori di </a:t>
-            </a:r>
-            <a:r>
-              <a:rPr lang="it-IT" sz="2400"/>
-              <a:t>k vettori (tanti </a:t>
-            </a:r>
-            <a:r>
-              <a:rPr lang="it-IT" sz="2400" dirty="0"/>
-              <a:t>quante sono le funzioni hash di permutazione) oppure mantenere in memoria le </a:t>
+              <a:t>: valutare se tenere in memoria un dizionario con valori di vettori di k vettori (tanti quante sono le funzioni hash di permutazione) oppure mantenere in memoria le </a:t>
             </a:r>
             <a:r>
               <a:rPr lang="it-IT" sz="2400" dirty="0" err="1"/>
@@ -4601,7 +4611,7 @@
             </a:r>
             <a:r>
               <a:rPr lang="it-IT" sz="2400" dirty="0"/>
-              <a:t>) e le signatures devono essere delle liste ordinate.</a:t>
+              <a:t>).</a:t>
             </a:r>
           </a:p>
           <a:p>
@@ -5175,8 +5185,21 @@
           <a:p>
             <a:r>
               <a:rPr lang="it-IT" sz="2400" dirty="0"/>
-              <a:t>Prima esecuzione della procedura sul dataset originale (senza semi-duplicati artificiali) per tarare i parametri</a:t>
-            </a:r>
+              <a:t>Prima esecuzione della procedura </a:t>
+            </a:r>
+            <a:r>
+              <a:rPr lang="it-IT" sz="2400"/>
+              <a:t>sulla collezione </a:t>
+            </a:r>
+            <a:r>
+              <a:rPr lang="it-IT" sz="2400" dirty="0"/>
+              <a:t>originale (senza semi-duplicati artificiali) per tarare i parametri e valutare il massimo grado di similarità presente tra documenti della </a:t>
+            </a:r>
+            <a:r>
+              <a:rPr lang="it-IT" sz="2400"/>
+              <a:t>collezione originale</a:t>
+            </a:r>
+            <a:endParaRPr lang="it-IT" sz="2400" dirty="0"/>
           </a:p>
           <a:p>
             <a:r>
@@ -5668,6 +5691,204 @@
     <p:extLst>
       <p:ext uri="{BB962C8B-B14F-4D97-AF65-F5344CB8AC3E}">
         <p14:creationId xmlns:p14="http://schemas.microsoft.com/office/powerpoint/2010/main" val="128019562"/>
+      </p:ext>
+    </p:extLst>
+  </p:cSld>
+  <p:clrMapOvr>
+    <a:masterClrMapping/>
+  </p:clrMapOvr>
+</p:sld>
+</file>
+
+<file path=ppt/slides/slide18.xml><?xml version="1.0" encoding="utf-8"?>
+<p:sld xmlns:a="http://schemas.openxmlformats.org/drawingml/2006/main" xmlns:r="http://schemas.openxmlformats.org/officeDocument/2006/relationships" xmlns:p="http://schemas.openxmlformats.org/presentationml/2006/main">
+  <p:cSld>
+    <p:spTree>
+      <p:nvGrpSpPr>
+        <p:cNvPr id="1" name="">
+          <a:extLst>
+            <a:ext uri="{FF2B5EF4-FFF2-40B4-BE49-F238E27FC236}">
+              <a16:creationId xmlns:a16="http://schemas.microsoft.com/office/drawing/2014/main" id="{BE60C251-DA10-ED1D-F214-CAC64DD11D08}"/>
+            </a:ext>
+          </a:extLst>
+        </p:cNvPr>
+        <p:cNvGrpSpPr/>
+        <p:nvPr/>
+      </p:nvGrpSpPr>
+      <p:grpSpPr>
+        <a:xfrm>
+          <a:off x="0" y="0"/>
+          <a:ext cx="0" cy="0"/>
+          <a:chOff x="0" y="0"/>
+          <a:chExt cx="0" cy="0"/>
+        </a:xfrm>
+      </p:grpSpPr>
+      <p:sp>
+        <p:nvSpPr>
+          <p:cNvPr id="2" name="Title 1">
+            <a:extLst>
+              <a:ext uri="{FF2B5EF4-FFF2-40B4-BE49-F238E27FC236}">
+                <a16:creationId xmlns:a16="http://schemas.microsoft.com/office/drawing/2014/main" id="{7234E41C-049C-7C0C-BB94-94674345EC26}"/>
+              </a:ext>
+            </a:extLst>
+          </p:cNvPr>
+          <p:cNvSpPr>
+            <a:spLocks noGrp="1"/>
+          </p:cNvSpPr>
+          <p:nvPr>
+            <p:ph type="title"/>
+          </p:nvPr>
+        </p:nvSpPr>
+        <p:spPr/>
+        <p:txBody>
+          <a:bodyPr/>
+          <a:lstStyle/>
+          <a:p>
+            <a:r>
+              <a:rPr lang="it-IT" dirty="0"/>
+              <a:t>Bibliografia</a:t>
+            </a:r>
+          </a:p>
+        </p:txBody>
+      </p:sp>
+      <p:sp>
+        <p:nvSpPr>
+          <p:cNvPr id="4" name="Footer Placeholder 3">
+            <a:extLst>
+              <a:ext uri="{FF2B5EF4-FFF2-40B4-BE49-F238E27FC236}">
+                <a16:creationId xmlns:a16="http://schemas.microsoft.com/office/drawing/2014/main" id="{43039135-4F8A-73DB-DDAC-14D9D53FCFEB}"/>
+              </a:ext>
+            </a:extLst>
+          </p:cNvPr>
+          <p:cNvSpPr>
+            <a:spLocks noGrp="1"/>
+          </p:cNvSpPr>
+          <p:nvPr>
+            <p:ph type="ftr" sz="quarter" idx="11"/>
+          </p:nvPr>
+        </p:nvSpPr>
+        <p:spPr/>
+        <p:txBody>
+          <a:bodyPr/>
+          <a:lstStyle/>
+          <a:p>
+            <a:r>
+              <a:rPr lang="en-US"/>
+              <a:t>Laurea SS - MIDST– 2023/2024 </a:t>
+            </a:r>
+          </a:p>
+        </p:txBody>
+      </p:sp>
+      <p:sp>
+        <p:nvSpPr>
+          <p:cNvPr id="5" name="Slide Number Placeholder 4">
+            <a:extLst>
+              <a:ext uri="{FF2B5EF4-FFF2-40B4-BE49-F238E27FC236}">
+                <a16:creationId xmlns:a16="http://schemas.microsoft.com/office/drawing/2014/main" id="{EA36D1BD-5504-16D8-F9BC-38153240E889}"/>
+              </a:ext>
+            </a:extLst>
+          </p:cNvPr>
+          <p:cNvSpPr>
+            <a:spLocks noGrp="1"/>
+          </p:cNvSpPr>
+          <p:nvPr>
+            <p:ph type="sldNum" sz="quarter" idx="12"/>
+          </p:nvPr>
+        </p:nvSpPr>
+        <p:spPr/>
+        <p:txBody>
+          <a:bodyPr/>
+          <a:lstStyle/>
+          <a:p>
+            <a:fld id="{FF73DAB7-F89A-F94F-8C5F-3F656CDF0A97}" type="slidenum">
+              <a:rPr lang="en-US" smtClean="0"/>
+              <a:pPr/>
+              <a:t>18</a:t>
+            </a:fld>
+            <a:endParaRPr lang="en-US"/>
+          </a:p>
+        </p:txBody>
+      </p:sp>
+      <p:sp>
+        <p:nvSpPr>
+          <p:cNvPr id="7" name="Segnaposto contenuto 6">
+            <a:extLst>
+              <a:ext uri="{FF2B5EF4-FFF2-40B4-BE49-F238E27FC236}">
+                <a16:creationId xmlns:a16="http://schemas.microsoft.com/office/drawing/2014/main" id="{4091DC37-599B-7DEE-D435-78294E57B1FD}"/>
+              </a:ext>
+            </a:extLst>
+          </p:cNvPr>
+          <p:cNvSpPr>
+            <a:spLocks noGrp="1"/>
+          </p:cNvSpPr>
+          <p:nvPr>
+            <p:ph idx="1"/>
+          </p:nvPr>
+        </p:nvSpPr>
+        <p:spPr/>
+        <p:txBody>
+          <a:bodyPr>
+            <a:normAutofit/>
+          </a:bodyPr>
+          <a:lstStyle/>
+          <a:p>
+            <a:pPr marL="0" indent="0">
+              <a:buNone/>
+            </a:pPr>
+            <a:r>
+              <a:rPr lang="en-US" sz="1800" dirty="0"/>
+              <a:t>6. </a:t>
+            </a:r>
+            <a:r>
+              <a:rPr lang="en-US" sz="1800" dirty="0" err="1"/>
+              <a:t>J.Lawrence</a:t>
+            </a:r>
+            <a:r>
+              <a:rPr lang="en-US" sz="1800" dirty="0"/>
+              <a:t> Carter, Mark N. </a:t>
+            </a:r>
+            <a:r>
+              <a:rPr lang="en-US" sz="1800" dirty="0" err="1"/>
+              <a:t>Wegman,Universal</a:t>
+            </a:r>
+            <a:r>
+              <a:rPr lang="en-US" sz="1800" dirty="0"/>
+              <a:t> classes of hash functions, Journal of Computer and System Sciences, Volume 18, Issue </a:t>
+            </a:r>
+            <a:r>
+              <a:rPr lang="en-US" sz="1800" dirty="0" err="1"/>
+              <a:t>2,1979,Pages</a:t>
+            </a:r>
+            <a:r>
+              <a:rPr lang="en-US" sz="1800" dirty="0"/>
+              <a:t> 143-154.</a:t>
+            </a:r>
+          </a:p>
+          <a:p>
+            <a:pPr marL="0" indent="0">
+              <a:buNone/>
+            </a:pPr>
+            <a:r>
+              <a:rPr lang="en-US" sz="1800" dirty="0"/>
+              <a:t>7. Michael O. Rabin (1981). "Fingerprinting by Random Polynomials. Center for Research in Computing Technology, Harvard University.</a:t>
+            </a:r>
+          </a:p>
+          <a:p>
+            <a:pPr marL="0" indent="0">
+              <a:buNone/>
+            </a:pPr>
+            <a:r>
+              <a:rPr lang="en-US" sz="1800" dirty="0"/>
+              <a:t>8. Jonathan D. Cohen. 1997. Recursive hashing functions for n-grams. ACM Trans. Inf. Syst. 15, 3 (July 1997), 291–320.</a:t>
+            </a:r>
+            <a:endParaRPr lang="it-IT" sz="1800" dirty="0"/>
+          </a:p>
+        </p:txBody>
+      </p:sp>
+    </p:spTree>
+    <p:extLst>
+      <p:ext uri="{BB962C8B-B14F-4D97-AF65-F5344CB8AC3E}">
+        <p14:creationId xmlns:p14="http://schemas.microsoft.com/office/powerpoint/2010/main" val="366584388"/>
       </p:ext>
     </p:extLst>
   </p:cSld>
@@ -7976,7 +8197,7 @@
         </p:spPr>
         <p:txBody>
           <a:bodyPr>
-            <a:normAutofit/>
+            <a:normAutofit fontScale="92500"/>
           </a:bodyPr>
           <a:lstStyle/>
           <a:p>
@@ -8078,7 +8299,7 @@
             </a:r>
             <a:r>
               <a:rPr lang="it-IT" sz="2400" dirty="0"/>
-              <a:t>: compromesso tra memoria (definizione del numero di bit dell’hash) impiegata e numero di collisioni per </a:t>
+              <a:t> (quasi necessaria per ridurre memoria occupata dalla signature): compromesso tra memoria (definizione del numero di bit dell’hash) impiegata e numero di collisioni per </a:t>
             </a:r>
             <a:r>
               <a:rPr lang="it-IT" sz="2400" dirty="0" err="1"/>
@@ -8090,11 +8311,19 @@
             </a:r>
             <a:r>
               <a:rPr lang="it-IT" sz="2400" dirty="0" err="1"/>
-              <a:t>fingerprint</a:t>
+              <a:t>Fingerprint</a:t>
             </a:r>
             <a:r>
               <a:rPr lang="it-IT" sz="2400" dirty="0"/>
-              <a:t>.</a:t>
+              <a:t> [7]. Considerare anche il Rolling </a:t>
+            </a:r>
+            <a:r>
+              <a:rPr lang="it-IT" sz="2400" dirty="0" err="1"/>
+              <a:t>Hashing</a:t>
+            </a:r>
+            <a:r>
+              <a:rPr lang="it-IT" sz="2400" dirty="0"/>
+              <a:t> [8] (concetto simile a calcolo di una media mobile)</a:t>
             </a:r>
           </a:p>
         </p:txBody>

</xml_diff>

<commit_message>
added c++ based hash functions
</commit_message>
<xml_diff>
--- a/slides/ita/slides_ita.pptx
+++ b/slides/ita/slides_ita.pptx
@@ -6,7 +6,7 @@
     <p:sldMasterId id="2147483665" r:id="rId2"/>
   </p:sldMasterIdLst>
   <p:notesMasterIdLst>
-    <p:notesMasterId r:id="rId21"/>
+    <p:notesMasterId r:id="rId22"/>
   </p:notesMasterIdLst>
   <p:sldIdLst>
     <p:sldId id="256" r:id="rId3"/>
@@ -21,12 +21,13 @@
     <p:sldId id="279" r:id="rId12"/>
     <p:sldId id="277" r:id="rId13"/>
     <p:sldId id="280" r:id="rId14"/>
-    <p:sldId id="278" r:id="rId15"/>
-    <p:sldId id="282" r:id="rId16"/>
-    <p:sldId id="276" r:id="rId17"/>
-    <p:sldId id="270" r:id="rId18"/>
-    <p:sldId id="271" r:id="rId19"/>
-    <p:sldId id="283" r:id="rId20"/>
+    <p:sldId id="284" r:id="rId15"/>
+    <p:sldId id="278" r:id="rId16"/>
+    <p:sldId id="282" r:id="rId17"/>
+    <p:sldId id="276" r:id="rId18"/>
+    <p:sldId id="270" r:id="rId19"/>
+    <p:sldId id="271" r:id="rId20"/>
+    <p:sldId id="283" r:id="rId21"/>
   </p:sldIdLst>
   <p:sldSz cx="9144000" cy="6858000" type="screen4x3"/>
   <p:notesSz cx="6858000" cy="9144000"/>
@@ -1264,7 +1265,7 @@
             <a:fld id="{46E5C021-FA02-7D4A-9AAB-ABFA99521826}" type="datetimeFigureOut">
               <a:rPr lang="it-IT" smtClean="0"/>
               <a:pPr/>
-              <a:t>24/02/2024</a:t>
+              <a:t>28/02/2024</a:t>
             </a:fld>
             <a:endParaRPr lang="en-US"/>
           </a:p>
@@ -1474,7 +1475,7 @@
             <a:fld id="{46E5C021-FA02-7D4A-9AAB-ABFA99521826}" type="datetimeFigureOut">
               <a:rPr lang="it-IT" smtClean="0"/>
               <a:pPr/>
-              <a:t>24/02/2024</a:t>
+              <a:t>28/02/2024</a:t>
             </a:fld>
             <a:endParaRPr lang="en-US"/>
           </a:p>
@@ -2165,7 +2166,7 @@
             <a:fld id="{46E5C021-FA02-7D4A-9AAB-ABFA99521826}" type="datetimeFigureOut">
               <a:rPr lang="it-IT" smtClean="0"/>
               <a:pPr/>
-              <a:t>24/02/2024</a:t>
+              <a:t>28/02/2024</a:t>
             </a:fld>
             <a:endParaRPr lang="en-US"/>
           </a:p>
@@ -2380,7 +2381,7 @@
             <a:fld id="{46E5C021-FA02-7D4A-9AAB-ABFA99521826}" type="datetimeFigureOut">
               <a:rPr lang="it-IT" smtClean="0"/>
               <a:pPr/>
-              <a:t>24/02/2024</a:t>
+              <a:t>28/02/2024</a:t>
             </a:fld>
             <a:endParaRPr lang="en-US"/>
           </a:p>
@@ -2688,7 +2689,7 @@
             <a:fld id="{46E5C021-FA02-7D4A-9AAB-ABFA99521826}" type="datetimeFigureOut">
               <a:rPr lang="it-IT" smtClean="0"/>
               <a:pPr/>
-              <a:t>24/02/2024</a:t>
+              <a:t>28/02/2024</a:t>
             </a:fld>
             <a:endParaRPr lang="en-US"/>
           </a:p>
@@ -3299,7 +3300,7 @@
             <a:fld id="{46E5C021-FA02-7D4A-9AAB-ABFA99521826}" type="datetimeFigureOut">
               <a:rPr lang="it-IT" smtClean="0"/>
               <a:pPr/>
-              <a:t>24/02/2024</a:t>
+              <a:t>28/02/2024</a:t>
             </a:fld>
             <a:endParaRPr lang="en-US"/>
           </a:p>
@@ -4675,6 +4676,266 @@
         <p:cNvPr id="1" name="">
           <a:extLst>
             <a:ext uri="{FF2B5EF4-FFF2-40B4-BE49-F238E27FC236}">
+              <a16:creationId xmlns:a16="http://schemas.microsoft.com/office/drawing/2014/main" id="{870CD569-991A-09B5-928C-91F1211985AA}"/>
+            </a:ext>
+          </a:extLst>
+        </p:cNvPr>
+        <p:cNvGrpSpPr/>
+        <p:nvPr/>
+      </p:nvGrpSpPr>
+      <p:grpSpPr>
+        <a:xfrm>
+          <a:off x="0" y="0"/>
+          <a:ext cx="0" cy="0"/>
+          <a:chOff x="0" y="0"/>
+          <a:chExt cx="0" cy="0"/>
+        </a:xfrm>
+      </p:grpSpPr>
+      <p:sp>
+        <p:nvSpPr>
+          <p:cNvPr id="2" name="Title 1">
+            <a:extLst>
+              <a:ext uri="{FF2B5EF4-FFF2-40B4-BE49-F238E27FC236}">
+                <a16:creationId xmlns:a16="http://schemas.microsoft.com/office/drawing/2014/main" id="{825E1638-3E00-AE61-195F-9C543AF97520}"/>
+              </a:ext>
+            </a:extLst>
+          </p:cNvPr>
+          <p:cNvSpPr>
+            <a:spLocks noGrp="1"/>
+          </p:cNvSpPr>
+          <p:nvPr>
+            <p:ph type="title"/>
+          </p:nvPr>
+        </p:nvSpPr>
+        <p:spPr/>
+        <p:txBody>
+          <a:bodyPr/>
+          <a:lstStyle/>
+          <a:p>
+            <a:r>
+              <a:rPr lang="it-IT" dirty="0" err="1"/>
+              <a:t>MinHash</a:t>
+            </a:r>
+            <a:r>
+              <a:rPr lang="it-IT" dirty="0"/>
+              <a:t> (3)</a:t>
+            </a:r>
+          </a:p>
+        </p:txBody>
+      </p:sp>
+      <p:sp>
+        <p:nvSpPr>
+          <p:cNvPr id="4" name="Footer Placeholder 3">
+            <a:extLst>
+              <a:ext uri="{FF2B5EF4-FFF2-40B4-BE49-F238E27FC236}">
+                <a16:creationId xmlns:a16="http://schemas.microsoft.com/office/drawing/2014/main" id="{EAC47109-FF6A-AE2D-8228-06EC367F59A3}"/>
+              </a:ext>
+            </a:extLst>
+          </p:cNvPr>
+          <p:cNvSpPr>
+            <a:spLocks noGrp="1"/>
+          </p:cNvSpPr>
+          <p:nvPr>
+            <p:ph type="ftr" sz="quarter" idx="11"/>
+          </p:nvPr>
+        </p:nvSpPr>
+        <p:spPr/>
+        <p:txBody>
+          <a:bodyPr/>
+          <a:lstStyle/>
+          <a:p>
+            <a:r>
+              <a:rPr lang="en-US"/>
+              <a:t>Laurea SS - MIDST– 2023/2024</a:t>
+            </a:r>
+          </a:p>
+        </p:txBody>
+      </p:sp>
+      <p:sp>
+        <p:nvSpPr>
+          <p:cNvPr id="5" name="Slide Number Placeholder 4">
+            <a:extLst>
+              <a:ext uri="{FF2B5EF4-FFF2-40B4-BE49-F238E27FC236}">
+                <a16:creationId xmlns:a16="http://schemas.microsoft.com/office/drawing/2014/main" id="{46BB151B-B4D2-F427-7E36-384D61D480CE}"/>
+              </a:ext>
+            </a:extLst>
+          </p:cNvPr>
+          <p:cNvSpPr>
+            <a:spLocks noGrp="1"/>
+          </p:cNvSpPr>
+          <p:nvPr>
+            <p:ph type="sldNum" sz="quarter" idx="12"/>
+          </p:nvPr>
+        </p:nvSpPr>
+        <p:spPr/>
+        <p:txBody>
+          <a:bodyPr/>
+          <a:lstStyle/>
+          <a:p>
+            <a:fld id="{FF73DAB7-F89A-F94F-8C5F-3F656CDF0A97}" type="slidenum">
+              <a:rPr lang="en-US" smtClean="0"/>
+              <a:pPr/>
+              <a:t>13</a:t>
+            </a:fld>
+            <a:endParaRPr lang="en-US"/>
+          </a:p>
+        </p:txBody>
+      </p:sp>
+      <p:sp>
+        <p:nvSpPr>
+          <p:cNvPr id="7" name="Segnaposto contenuto 6">
+            <a:extLst>
+              <a:ext uri="{FF2B5EF4-FFF2-40B4-BE49-F238E27FC236}">
+                <a16:creationId xmlns:a16="http://schemas.microsoft.com/office/drawing/2014/main" id="{0481EB15-ADF0-1873-F25A-9CE1F1ECF838}"/>
+              </a:ext>
+            </a:extLst>
+          </p:cNvPr>
+          <p:cNvSpPr>
+            <a:spLocks noGrp="1"/>
+          </p:cNvSpPr>
+          <p:nvPr>
+            <p:ph idx="1"/>
+          </p:nvPr>
+        </p:nvSpPr>
+        <p:spPr/>
+        <p:txBody>
+          <a:bodyPr>
+            <a:normAutofit fontScale="92500" lnSpcReduction="10000"/>
+          </a:bodyPr>
+          <a:lstStyle/>
+          <a:p>
+            <a:pPr marL="0" indent="0">
+              <a:buNone/>
+            </a:pPr>
+            <a:r>
+              <a:rPr lang="it-IT" sz="2400" dirty="0" err="1"/>
+              <a:t>Hashing</a:t>
+            </a:r>
+            <a:r>
+              <a:rPr lang="it-IT" sz="2400" dirty="0"/>
+              <a:t> universale[6].</a:t>
+            </a:r>
+          </a:p>
+          <a:p>
+            <a:pPr marL="0" indent="0">
+              <a:buNone/>
+            </a:pPr>
+            <a:r>
+              <a:rPr lang="it-IT" sz="2400" dirty="0"/>
+              <a:t>h : U -&gt; [m] (</a:t>
+            </a:r>
+            <a:r>
+              <a:rPr lang="it-IT" sz="2400" dirty="0" err="1"/>
+              <a:t>bins</a:t>
+            </a:r>
+            <a:r>
+              <a:rPr lang="it-IT" sz="2400" dirty="0"/>
+              <a:t>).</a:t>
+            </a:r>
+          </a:p>
+          <a:p>
+            <a:pPr marL="0" indent="0">
+              <a:buNone/>
+            </a:pPr>
+            <a:r>
+              <a:rPr lang="it-IT" sz="2400" dirty="0"/>
+              <a:t>Famiglia H:{h: U -&gt; [m]} è detta k-universale se per ogni x != y in U si ha |{h in H: h(x) = h(y)}| &lt;= |H|/(</a:t>
+            </a:r>
+            <a:r>
+              <a:rPr lang="it-IT" sz="2400" dirty="0" err="1"/>
+              <a:t>m^k</a:t>
+            </a:r>
+            <a:r>
+              <a:rPr lang="it-IT" sz="2400" dirty="0"/>
+              <a:t>).</a:t>
+            </a:r>
+          </a:p>
+          <a:p>
+            <a:pPr marL="0" indent="0">
+              <a:buNone/>
+            </a:pPr>
+            <a:r>
+              <a:rPr lang="it-IT" sz="2400" dirty="0"/>
+              <a:t>Una semplice implementazione da [6] è la famiglia di funzioni</a:t>
+            </a:r>
+          </a:p>
+          <a:p>
+            <a:pPr marL="0" indent="0">
+              <a:buNone/>
+            </a:pPr>
+            <a:r>
+              <a:rPr lang="it-IT" sz="2400" dirty="0"/>
+              <a:t>h(x) = [(a*x + b) mod p] mod m</a:t>
+            </a:r>
+          </a:p>
+          <a:p>
+            <a:pPr marL="0" indent="0">
+              <a:buNone/>
+            </a:pPr>
+            <a:r>
+              <a:rPr lang="it-IT" sz="2400" dirty="0"/>
+              <a:t>Con a e b interi estratti casualmente e p numero primo.</a:t>
+            </a:r>
+          </a:p>
+          <a:p>
+            <a:pPr marL="0" indent="0">
+              <a:buNone/>
+            </a:pPr>
+            <a:r>
+              <a:rPr lang="it-IT" sz="2400" dirty="0"/>
+              <a:t>La presenza di operazioni modulo rende però il calcolo non immediato.</a:t>
+            </a:r>
+          </a:p>
+          <a:p>
+            <a:pPr marL="0" indent="0">
+              <a:buNone/>
+            </a:pPr>
+            <a:r>
+              <a:rPr lang="it-IT" sz="2400" dirty="0"/>
+              <a:t>Possibilità:</a:t>
+            </a:r>
+          </a:p>
+          <a:p>
+            <a:pPr marL="0" indent="0">
+              <a:buNone/>
+            </a:pPr>
+            <a:r>
+              <a:rPr lang="it-IT" sz="2400" dirty="0"/>
+              <a:t>- calcolare l’hash tramite uno script in C o C++</a:t>
+            </a:r>
+          </a:p>
+          <a:p>
+            <a:pPr marL="0" indent="0">
+              <a:buNone/>
+            </a:pPr>
+            <a:r>
+              <a:rPr lang="it-IT" sz="2400" dirty="0"/>
+              <a:t>- impiegare dei «trucchi» computazionali</a:t>
+            </a:r>
+          </a:p>
+        </p:txBody>
+      </p:sp>
+    </p:spTree>
+    <p:extLst>
+      <p:ext uri="{BB962C8B-B14F-4D97-AF65-F5344CB8AC3E}">
+        <p14:creationId xmlns:p14="http://schemas.microsoft.com/office/powerpoint/2010/main" val="177787254"/>
+      </p:ext>
+    </p:extLst>
+  </p:cSld>
+  <p:clrMapOvr>
+    <a:masterClrMapping/>
+  </p:clrMapOvr>
+</p:sld>
+</file>
+
+<file path=ppt/slides/slide14.xml><?xml version="1.0" encoding="utf-8"?>
+<p:sld xmlns:a="http://schemas.openxmlformats.org/drawingml/2006/main" xmlns:r="http://schemas.openxmlformats.org/officeDocument/2006/relationships" xmlns:p="http://schemas.openxmlformats.org/presentationml/2006/main">
+  <p:cSld>
+    <p:spTree>
+      <p:nvGrpSpPr>
+        <p:cNvPr id="1" name="">
+          <a:extLst>
+            <a:ext uri="{FF2B5EF4-FFF2-40B4-BE49-F238E27FC236}">
               <a16:creationId xmlns:a16="http://schemas.microsoft.com/office/drawing/2014/main" id="{173DA18C-F377-E081-FC42-8702194F57CB}"/>
             </a:ext>
           </a:extLst>
@@ -4771,7 +5032,7 @@
             <a:fld id="{FF73DAB7-F89A-F94F-8C5F-3F656CDF0A97}" type="slidenum">
               <a:rPr lang="en-US" smtClean="0"/>
               <a:pPr/>
-              <a:t>13</a:t>
+              <a:t>14</a:t>
             </a:fld>
             <a:endParaRPr lang="en-US"/>
           </a:p>
@@ -4898,7 +5159,7 @@
 </p:sld>
 </file>
 
-<file path=ppt/slides/slide14.xml><?xml version="1.0" encoding="utf-8"?>
+<file path=ppt/slides/slide15.xml><?xml version="1.0" encoding="utf-8"?>
 <p:sld xmlns:a="http://schemas.openxmlformats.org/drawingml/2006/main" xmlns:r="http://schemas.openxmlformats.org/officeDocument/2006/relationships" xmlns:p="http://schemas.openxmlformats.org/presentationml/2006/main">
   <p:cSld>
     <p:spTree>
@@ -5002,7 +5263,7 @@
             <a:fld id="{FF73DAB7-F89A-F94F-8C5F-3F656CDF0A97}" type="slidenum">
               <a:rPr lang="en-US" smtClean="0"/>
               <a:pPr/>
-              <a:t>14</a:t>
+              <a:t>15</a:t>
             </a:fld>
             <a:endParaRPr lang="en-US"/>
           </a:p>
@@ -5051,7 +5312,7 @@
 </p:sld>
 </file>
 
-<file path=ppt/slides/slide15.xml><?xml version="1.0" encoding="utf-8"?>
+<file path=ppt/slides/slide16.xml><?xml version="1.0" encoding="utf-8"?>
 <p:sld xmlns:a="http://schemas.openxmlformats.org/drawingml/2006/main" xmlns:r="http://schemas.openxmlformats.org/officeDocument/2006/relationships" xmlns:p="http://schemas.openxmlformats.org/presentationml/2006/main">
   <p:cSld>
     <p:spTree>
@@ -5154,7 +5415,7 @@
             <a:fld id="{FF73DAB7-F89A-F94F-8C5F-3F656CDF0A97}" type="slidenum">
               <a:rPr lang="en-US" smtClean="0"/>
               <a:pPr/>
-              <a:t>15</a:t>
+              <a:t>16</a:t>
             </a:fld>
             <a:endParaRPr lang="en-US"/>
           </a:p>
@@ -5213,147 +5474,6 @@
     <p:extLst>
       <p:ext uri="{BB962C8B-B14F-4D97-AF65-F5344CB8AC3E}">
         <p14:creationId xmlns:p14="http://schemas.microsoft.com/office/powerpoint/2010/main" val="2304361174"/>
-      </p:ext>
-    </p:extLst>
-  </p:cSld>
-  <p:clrMapOvr>
-    <a:masterClrMapping/>
-  </p:clrMapOvr>
-</p:sld>
-</file>
-
-<file path=ppt/slides/slide16.xml><?xml version="1.0" encoding="utf-8"?>
-<p:sld xmlns:a="http://schemas.openxmlformats.org/drawingml/2006/main" xmlns:r="http://schemas.openxmlformats.org/officeDocument/2006/relationships" xmlns:p="http://schemas.openxmlformats.org/presentationml/2006/main">
-  <p:cSld>
-    <p:spTree>
-      <p:nvGrpSpPr>
-        <p:cNvPr id="1" name=""/>
-        <p:cNvGrpSpPr/>
-        <p:nvPr/>
-      </p:nvGrpSpPr>
-      <p:grpSpPr>
-        <a:xfrm>
-          <a:off x="0" y="0"/>
-          <a:ext cx="0" cy="0"/>
-          <a:chOff x="0" y="0"/>
-          <a:chExt cx="0" cy="0"/>
-        </a:xfrm>
-      </p:grpSpPr>
-      <p:sp>
-        <p:nvSpPr>
-          <p:cNvPr id="2" name="Title 1">
-            <a:extLst>
-              <a:ext uri="{FF2B5EF4-FFF2-40B4-BE49-F238E27FC236}">
-                <a16:creationId xmlns:a16="http://schemas.microsoft.com/office/drawing/2014/main" id="{AEC5A80E-581C-1B46-9C70-7C00331B9233}"/>
-              </a:ext>
-            </a:extLst>
-          </p:cNvPr>
-          <p:cNvSpPr>
-            <a:spLocks noGrp="1"/>
-          </p:cNvSpPr>
-          <p:nvPr>
-            <p:ph type="title"/>
-          </p:nvPr>
-        </p:nvSpPr>
-        <p:spPr/>
-        <p:txBody>
-          <a:bodyPr/>
-          <a:lstStyle/>
-          <a:p>
-            <a:r>
-              <a:rPr lang="it-IT"/>
-              <a:t>Conclusioni</a:t>
-            </a:r>
-          </a:p>
-        </p:txBody>
-      </p:sp>
-      <p:sp>
-        <p:nvSpPr>
-          <p:cNvPr id="4" name="Footer Placeholder 3">
-            <a:extLst>
-              <a:ext uri="{FF2B5EF4-FFF2-40B4-BE49-F238E27FC236}">
-                <a16:creationId xmlns:a16="http://schemas.microsoft.com/office/drawing/2014/main" id="{D46AA9DE-DDA7-E54C-A21C-54B9077604CB}"/>
-              </a:ext>
-            </a:extLst>
-          </p:cNvPr>
-          <p:cNvSpPr>
-            <a:spLocks noGrp="1"/>
-          </p:cNvSpPr>
-          <p:nvPr>
-            <p:ph type="ftr" sz="quarter" idx="11"/>
-          </p:nvPr>
-        </p:nvSpPr>
-        <p:spPr/>
-        <p:txBody>
-          <a:bodyPr/>
-          <a:lstStyle/>
-          <a:p>
-            <a:r>
-              <a:rPr lang="en-US"/>
-              <a:t>Laurea SS - MIDST– 2023/2024</a:t>
-            </a:r>
-          </a:p>
-        </p:txBody>
-      </p:sp>
-      <p:sp>
-        <p:nvSpPr>
-          <p:cNvPr id="5" name="Slide Number Placeholder 4">
-            <a:extLst>
-              <a:ext uri="{FF2B5EF4-FFF2-40B4-BE49-F238E27FC236}">
-                <a16:creationId xmlns:a16="http://schemas.microsoft.com/office/drawing/2014/main" id="{18BC653A-704D-8348-9299-88A813BA2A97}"/>
-              </a:ext>
-            </a:extLst>
-          </p:cNvPr>
-          <p:cNvSpPr>
-            <a:spLocks noGrp="1"/>
-          </p:cNvSpPr>
-          <p:nvPr>
-            <p:ph type="sldNum" sz="quarter" idx="12"/>
-          </p:nvPr>
-        </p:nvSpPr>
-        <p:spPr/>
-        <p:txBody>
-          <a:bodyPr/>
-          <a:lstStyle/>
-          <a:p>
-            <a:fld id="{FF73DAB7-F89A-F94F-8C5F-3F656CDF0A97}" type="slidenum">
-              <a:rPr lang="en-US" smtClean="0"/>
-              <a:pPr/>
-              <a:t>16</a:t>
-            </a:fld>
-            <a:endParaRPr lang="en-US"/>
-          </a:p>
-        </p:txBody>
-      </p:sp>
-      <p:sp>
-        <p:nvSpPr>
-          <p:cNvPr id="7" name="Segnaposto contenuto 6">
-            <a:extLst>
-              <a:ext uri="{FF2B5EF4-FFF2-40B4-BE49-F238E27FC236}">
-                <a16:creationId xmlns:a16="http://schemas.microsoft.com/office/drawing/2014/main" id="{513B8653-E432-27B5-7A84-AD903EA7535E}"/>
-              </a:ext>
-            </a:extLst>
-          </p:cNvPr>
-          <p:cNvSpPr>
-            <a:spLocks noGrp="1"/>
-          </p:cNvSpPr>
-          <p:nvPr>
-            <p:ph idx="1"/>
-          </p:nvPr>
-        </p:nvSpPr>
-        <p:spPr/>
-        <p:txBody>
-          <a:bodyPr/>
-          <a:lstStyle/>
-          <a:p>
-            <a:endParaRPr lang="it-IT" dirty="0"/>
-          </a:p>
-        </p:txBody>
-      </p:sp>
-    </p:spTree>
-    <p:extLst>
-      <p:ext uri="{BB962C8B-B14F-4D97-AF65-F5344CB8AC3E}">
-        <p14:creationId xmlns:p14="http://schemas.microsoft.com/office/powerpoint/2010/main" val="1292597256"/>
       </p:ext>
     </p:extLst>
   </p:cSld>
@@ -5385,6 +5505,147 @@
           <p:cNvPr id="2" name="Title 1">
             <a:extLst>
               <a:ext uri="{FF2B5EF4-FFF2-40B4-BE49-F238E27FC236}">
+                <a16:creationId xmlns:a16="http://schemas.microsoft.com/office/drawing/2014/main" id="{AEC5A80E-581C-1B46-9C70-7C00331B9233}"/>
+              </a:ext>
+            </a:extLst>
+          </p:cNvPr>
+          <p:cNvSpPr>
+            <a:spLocks noGrp="1"/>
+          </p:cNvSpPr>
+          <p:nvPr>
+            <p:ph type="title"/>
+          </p:nvPr>
+        </p:nvSpPr>
+        <p:spPr/>
+        <p:txBody>
+          <a:bodyPr/>
+          <a:lstStyle/>
+          <a:p>
+            <a:r>
+              <a:rPr lang="it-IT"/>
+              <a:t>Conclusioni</a:t>
+            </a:r>
+          </a:p>
+        </p:txBody>
+      </p:sp>
+      <p:sp>
+        <p:nvSpPr>
+          <p:cNvPr id="4" name="Footer Placeholder 3">
+            <a:extLst>
+              <a:ext uri="{FF2B5EF4-FFF2-40B4-BE49-F238E27FC236}">
+                <a16:creationId xmlns:a16="http://schemas.microsoft.com/office/drawing/2014/main" id="{D46AA9DE-DDA7-E54C-A21C-54B9077604CB}"/>
+              </a:ext>
+            </a:extLst>
+          </p:cNvPr>
+          <p:cNvSpPr>
+            <a:spLocks noGrp="1"/>
+          </p:cNvSpPr>
+          <p:nvPr>
+            <p:ph type="ftr" sz="quarter" idx="11"/>
+          </p:nvPr>
+        </p:nvSpPr>
+        <p:spPr/>
+        <p:txBody>
+          <a:bodyPr/>
+          <a:lstStyle/>
+          <a:p>
+            <a:r>
+              <a:rPr lang="en-US"/>
+              <a:t>Laurea SS - MIDST– 2023/2024</a:t>
+            </a:r>
+          </a:p>
+        </p:txBody>
+      </p:sp>
+      <p:sp>
+        <p:nvSpPr>
+          <p:cNvPr id="5" name="Slide Number Placeholder 4">
+            <a:extLst>
+              <a:ext uri="{FF2B5EF4-FFF2-40B4-BE49-F238E27FC236}">
+                <a16:creationId xmlns:a16="http://schemas.microsoft.com/office/drawing/2014/main" id="{18BC653A-704D-8348-9299-88A813BA2A97}"/>
+              </a:ext>
+            </a:extLst>
+          </p:cNvPr>
+          <p:cNvSpPr>
+            <a:spLocks noGrp="1"/>
+          </p:cNvSpPr>
+          <p:nvPr>
+            <p:ph type="sldNum" sz="quarter" idx="12"/>
+          </p:nvPr>
+        </p:nvSpPr>
+        <p:spPr/>
+        <p:txBody>
+          <a:bodyPr/>
+          <a:lstStyle/>
+          <a:p>
+            <a:fld id="{FF73DAB7-F89A-F94F-8C5F-3F656CDF0A97}" type="slidenum">
+              <a:rPr lang="en-US" smtClean="0"/>
+              <a:pPr/>
+              <a:t>17</a:t>
+            </a:fld>
+            <a:endParaRPr lang="en-US"/>
+          </a:p>
+        </p:txBody>
+      </p:sp>
+      <p:sp>
+        <p:nvSpPr>
+          <p:cNvPr id="7" name="Segnaposto contenuto 6">
+            <a:extLst>
+              <a:ext uri="{FF2B5EF4-FFF2-40B4-BE49-F238E27FC236}">
+                <a16:creationId xmlns:a16="http://schemas.microsoft.com/office/drawing/2014/main" id="{513B8653-E432-27B5-7A84-AD903EA7535E}"/>
+              </a:ext>
+            </a:extLst>
+          </p:cNvPr>
+          <p:cNvSpPr>
+            <a:spLocks noGrp="1"/>
+          </p:cNvSpPr>
+          <p:nvPr>
+            <p:ph idx="1"/>
+          </p:nvPr>
+        </p:nvSpPr>
+        <p:spPr/>
+        <p:txBody>
+          <a:bodyPr/>
+          <a:lstStyle/>
+          <a:p>
+            <a:endParaRPr lang="it-IT" dirty="0"/>
+          </a:p>
+        </p:txBody>
+      </p:sp>
+    </p:spTree>
+    <p:extLst>
+      <p:ext uri="{BB962C8B-B14F-4D97-AF65-F5344CB8AC3E}">
+        <p14:creationId xmlns:p14="http://schemas.microsoft.com/office/powerpoint/2010/main" val="1292597256"/>
+      </p:ext>
+    </p:extLst>
+  </p:cSld>
+  <p:clrMapOvr>
+    <a:masterClrMapping/>
+  </p:clrMapOvr>
+</p:sld>
+</file>
+
+<file path=ppt/slides/slide18.xml><?xml version="1.0" encoding="utf-8"?>
+<p:sld xmlns:a="http://schemas.openxmlformats.org/drawingml/2006/main" xmlns:r="http://schemas.openxmlformats.org/officeDocument/2006/relationships" xmlns:p="http://schemas.openxmlformats.org/presentationml/2006/main">
+  <p:cSld>
+    <p:spTree>
+      <p:nvGrpSpPr>
+        <p:cNvPr id="1" name=""/>
+        <p:cNvGrpSpPr/>
+        <p:nvPr/>
+      </p:nvGrpSpPr>
+      <p:grpSpPr>
+        <a:xfrm>
+          <a:off x="0" y="0"/>
+          <a:ext cx="0" cy="0"/>
+          <a:chOff x="0" y="0"/>
+          <a:chExt cx="0" cy="0"/>
+        </a:xfrm>
+      </p:grpSpPr>
+      <p:sp>
+        <p:nvSpPr>
+          <p:cNvPr id="2" name="Title 1">
+            <a:extLst>
+              <a:ext uri="{FF2B5EF4-FFF2-40B4-BE49-F238E27FC236}">
                 <a16:creationId xmlns:a16="http://schemas.microsoft.com/office/drawing/2014/main" id="{1D135DA9-1BAF-354B-BD84-CB98CDF8AF4D}"/>
               </a:ext>
             </a:extLst>
@@ -5460,7 +5721,7 @@
             <a:fld id="{FF73DAB7-F89A-F94F-8C5F-3F656CDF0A97}" type="slidenum">
               <a:rPr lang="en-US" smtClean="0"/>
               <a:pPr/>
-              <a:t>17</a:t>
+              <a:t>18</a:t>
             </a:fld>
             <a:endParaRPr lang="en-US"/>
           </a:p>
@@ -5700,7 +5961,7 @@
 </p:sld>
 </file>
 
-<file path=ppt/slides/slide18.xml><?xml version="1.0" encoding="utf-8"?>
+<file path=ppt/slides/slide19.xml><?xml version="1.0" encoding="utf-8"?>
 <p:sld xmlns:a="http://schemas.openxmlformats.org/drawingml/2006/main" xmlns:r="http://schemas.openxmlformats.org/officeDocument/2006/relationships" xmlns:p="http://schemas.openxmlformats.org/presentationml/2006/main">
   <p:cSld>
     <p:spTree>
@@ -5803,7 +6064,7 @@
             <a:fld id="{FF73DAB7-F89A-F94F-8C5F-3F656CDF0A97}" type="slidenum">
               <a:rPr lang="en-US" smtClean="0"/>
               <a:pPr/>
-              <a:t>18</a:t>
+              <a:t>19</a:t>
             </a:fld>
             <a:endParaRPr lang="en-US"/>
           </a:p>

</xml_diff>

<commit_message>
added list implementation of LSH bands, testing needed
</commit_message>
<xml_diff>
--- a/slides/ita/slides_ita.pptx
+++ b/slides/ita/slides_ita.pptx
@@ -1265,7 +1265,7 @@
             <a:fld id="{46E5C021-FA02-7D4A-9AAB-ABFA99521826}" type="datetimeFigureOut">
               <a:rPr lang="it-IT" smtClean="0"/>
               <a:pPr/>
-              <a:t>02/03/2024</a:t>
+              <a:t>21/02/2025</a:t>
             </a:fld>
             <a:endParaRPr lang="en-US"/>
           </a:p>
@@ -1475,7 +1475,7 @@
             <a:fld id="{46E5C021-FA02-7D4A-9AAB-ABFA99521826}" type="datetimeFigureOut">
               <a:rPr lang="it-IT" smtClean="0"/>
               <a:pPr/>
-              <a:t>02/03/2024</a:t>
+              <a:t>21/02/2025</a:t>
             </a:fld>
             <a:endParaRPr lang="en-US"/>
           </a:p>
@@ -2166,7 +2166,7 @@
             <a:fld id="{46E5C021-FA02-7D4A-9AAB-ABFA99521826}" type="datetimeFigureOut">
               <a:rPr lang="it-IT" smtClean="0"/>
               <a:pPr/>
-              <a:t>02/03/2024</a:t>
+              <a:t>21/02/2025</a:t>
             </a:fld>
             <a:endParaRPr lang="en-US"/>
           </a:p>
@@ -2381,7 +2381,7 @@
             <a:fld id="{46E5C021-FA02-7D4A-9AAB-ABFA99521826}" type="datetimeFigureOut">
               <a:rPr lang="it-IT" smtClean="0"/>
               <a:pPr/>
-              <a:t>02/03/2024</a:t>
+              <a:t>21/02/2025</a:t>
             </a:fld>
             <a:endParaRPr lang="en-US"/>
           </a:p>
@@ -2689,7 +2689,7 @@
             <a:fld id="{46E5C021-FA02-7D4A-9AAB-ABFA99521826}" type="datetimeFigureOut">
               <a:rPr lang="it-IT" smtClean="0"/>
               <a:pPr/>
-              <a:t>02/03/2024</a:t>
+              <a:t>21/02/2025</a:t>
             </a:fld>
             <a:endParaRPr lang="en-US"/>
           </a:p>
@@ -3300,7 +3300,7 @@
             <a:fld id="{46E5C021-FA02-7D4A-9AAB-ABFA99521826}" type="datetimeFigureOut">
               <a:rPr lang="it-IT" smtClean="0"/>
               <a:pPr/>
-              <a:t>02/03/2024</a:t>
+              <a:t>21/02/2025</a:t>
             </a:fld>
             <a:endParaRPr lang="en-US"/>
           </a:p>
@@ -4518,7 +4518,7 @@
             </a:pPr>
             <a:r>
               <a:rPr lang="it-IT" sz="2400" dirty="0"/>
-              <a:t>Esempio, con 100 permutazioni, interi a 32 bit e 600’000 documenti: </a:t>
+              <a:t>Esempio, con 100 permutazioni, interi a 32 bit e 10^6 documenti: </a:t>
             </a:r>
             <a:r>
               <a:rPr lang="it-IT" sz="2400" dirty="0" err="1"/>
@@ -4526,7 +4526,7 @@
             </a:r>
             <a:r>
               <a:rPr lang="it-IT" sz="2400" dirty="0"/>
-              <a:t> = 240 megabyte</a:t>
+              <a:t> = 380 megabyte</a:t>
             </a:r>
           </a:p>
           <a:p>
@@ -5157,20 +5157,6 @@
           <a:p>
             <a:r>
               <a:rPr lang="it-IT" sz="2400" dirty="0"/>
-              <a:t>Struttura dati per i bucket: hash-</a:t>
-            </a:r>
-            <a:r>
-              <a:rPr lang="it-IT" sz="2400" dirty="0" err="1"/>
-              <a:t>table</a:t>
-            </a:r>
-            <a:r>
-              <a:rPr lang="it-IT" sz="2400" dirty="0"/>
-              <a:t> dove ad ogni chiave è associata una lista con gli id dei documenti</a:t>
-            </a:r>
-          </a:p>
-          <a:p>
-            <a:r>
-              <a:rPr lang="it-IT" sz="2400" dirty="0"/>
               <a:t>Diverse implementazioni: </a:t>
             </a:r>
           </a:p>
@@ -5185,33 +5171,8 @@
             <a:pPr lvl="2"/>
             <a:r>
               <a:rPr lang="it-IT" sz="1600" dirty="0"/>
-              <a:t>Hash-</a:t>
-            </a:r>
-            <a:r>
-              <a:rPr lang="it-IT" sz="1600" dirty="0" err="1"/>
-              <a:t>table</a:t>
-            </a:r>
-            <a:endParaRPr lang="it-IT" sz="1600" dirty="0"/>
-          </a:p>
-          <a:p>
-            <a:pPr lvl="2"/>
-            <a:r>
-              <a:rPr lang="it-IT" sz="1600" dirty="0"/>
-              <a:t>Hash-</a:t>
-            </a:r>
-            <a:r>
-              <a:rPr lang="it-IT" sz="1600" dirty="0" err="1"/>
-              <a:t>tree</a:t>
-            </a:r>
-            <a:r>
-              <a:rPr lang="it-IT" sz="1600" dirty="0"/>
-              <a:t> o b-</a:t>
-            </a:r>
-            <a:r>
-              <a:rPr lang="it-IT" sz="1600" dirty="0" err="1"/>
-              <a:t>tree</a:t>
-            </a:r>
-            <a:endParaRPr lang="it-IT" sz="1600" dirty="0"/>
+              <a:t>Liste: ogni banda ha N (= n° documenti)  bucket, ogni bucket è implementato come una lista, se ogni bucket contiene un elemento assumiamo che occupi circa 64 byte; una banda occuperà circa 60 MB, per 30 bande la memoria occupata è di circa 1.8 GB</a:t>
+            </a:r>
           </a:p>
           <a:p>
             <a:pPr lvl="1"/>
@@ -5219,6 +5180,7 @@
               <a:rPr lang="it-IT" sz="2000" dirty="0"/>
               <a:t>In memoria di massa</a:t>
             </a:r>
+            <a:endParaRPr lang="it-IT" sz="1600" dirty="0"/>
           </a:p>
           <a:p>
             <a:pPr marL="363537" lvl="1" indent="0">

</xml_diff>